<commit_message>
More intro in presentation.
</commit_message>
<xml_diff>
--- a/JavaMUG - Guava.pptx
+++ b/JavaMUG - Guava.pptx
@@ -6,6 +6,8 @@
   </p:sldMasterIdLst>
   <p:sldIdLst>
     <p:sldId id="256" r:id="rId2"/>
+    <p:sldId id="257" r:id="rId3"/>
+    <p:sldId id="258" r:id="rId4"/>
   </p:sldIdLst>
   <p:sldSz cx="9144000" cy="6858000" type="screen4x3"/>
   <p:notesSz cx="6858000" cy="9144000"/>
@@ -3943,9 +3945,16 @@
             <p:ph type="subTitle" idx="1"/>
           </p:nvPr>
         </p:nvSpPr>
-        <p:spPr/>
-        <p:txBody>
-          <a:bodyPr/>
+        <p:spPr>
+          <a:xfrm>
+            <a:off x="1322921" y="3299012"/>
+            <a:ext cx="6498159" cy="916641"/>
+          </a:xfrm>
+        </p:spPr>
+        <p:txBody>
+          <a:bodyPr>
+            <a:normAutofit lnSpcReduction="10000"/>
+          </a:bodyPr>
           <a:lstStyle/>
           <a:p>
             <a:r>
@@ -3956,13 +3965,15 @@
           <a:p>
             <a:r>
               <a:rPr lang="en-US" dirty="0" smtClean="0"/>
-              <a:t>Java </a:t>
-            </a:r>
-            <a:r>
-              <a:rPr lang="en-US" smtClean="0"/>
-              <a:t>MUG – September 14, 2011</a:t>
-            </a:r>
-            <a:endParaRPr lang="en-US"/>
+              <a:t>Java MUG</a:t>
+            </a:r>
+          </a:p>
+          <a:p>
+            <a:r>
+              <a:rPr lang="en-US" dirty="0" smtClean="0"/>
+              <a:t>September 14, 2011</a:t>
+            </a:r>
+            <a:endParaRPr lang="en-US" dirty="0"/>
           </a:p>
         </p:txBody>
       </p:sp>
@@ -3970,6 +3981,263 @@
     <p:extLst>
       <p:ext uri="{BB962C8B-B14F-4D97-AF65-F5344CB8AC3E}">
         <p14:creationId xmlns:p14="http://schemas.microsoft.com/office/powerpoint/2010/main" val="728472404"/>
+      </p:ext>
+    </p:extLst>
+  </p:cSld>
+  <p:clrMapOvr>
+    <a:masterClrMapping/>
+  </p:clrMapOvr>
+</p:sld>
+</file>
+
+<file path=ppt/slides/slide2.xml><?xml version="1.0" encoding="utf-8"?>
+<p:sld xmlns:a="http://schemas.openxmlformats.org/drawingml/2006/main" xmlns:r="http://schemas.openxmlformats.org/officeDocument/2006/relationships" xmlns:p="http://schemas.openxmlformats.org/presentationml/2006/main">
+  <p:cSld>
+    <p:spTree>
+      <p:nvGrpSpPr>
+        <p:cNvPr id="1" name=""/>
+        <p:cNvGrpSpPr/>
+        <p:nvPr/>
+      </p:nvGrpSpPr>
+      <p:grpSpPr>
+        <a:xfrm>
+          <a:off x="0" y="0"/>
+          <a:ext cx="0" cy="0"/>
+          <a:chOff x="0" y="0"/>
+          <a:chExt cx="0" cy="0"/>
+        </a:xfrm>
+      </p:grpSpPr>
+      <p:sp>
+        <p:nvSpPr>
+          <p:cNvPr id="2" name="Title 1"/>
+          <p:cNvSpPr>
+            <a:spLocks noGrp="1"/>
+          </p:cNvSpPr>
+          <p:nvPr>
+            <p:ph type="title"/>
+          </p:nvPr>
+        </p:nvSpPr>
+        <p:spPr/>
+        <p:txBody>
+          <a:bodyPr/>
+          <a:lstStyle/>
+          <a:p>
+            <a:r>
+              <a:rPr lang="en-US" dirty="0" smtClean="0"/>
+              <a:t>What is Guava?</a:t>
+            </a:r>
+            <a:endParaRPr lang="en-US" dirty="0"/>
+          </a:p>
+        </p:txBody>
+      </p:sp>
+      <p:sp>
+        <p:nvSpPr>
+          <p:cNvPr id="3" name="Content Placeholder 2"/>
+          <p:cNvSpPr>
+            <a:spLocks noGrp="1"/>
+          </p:cNvSpPr>
+          <p:nvPr>
+            <p:ph idx="1"/>
+          </p:nvPr>
+        </p:nvSpPr>
+        <p:spPr>
+          <a:xfrm>
+            <a:off x="549275" y="1600201"/>
+            <a:ext cx="8042276" cy="2415377"/>
+          </a:xfrm>
+        </p:spPr>
+        <p:txBody>
+          <a:bodyPr/>
+          <a:lstStyle/>
+          <a:p>
+            <a:r>
+              <a:rPr lang="en-US" dirty="0" smtClean="0"/>
+              <a:t>Google library used by other Google Java projects</a:t>
+            </a:r>
+          </a:p>
+          <a:p>
+            <a:r>
+              <a:rPr lang="en-US" dirty="0" smtClean="0"/>
+              <a:t>Regular releases (roughly quarterly)</a:t>
+            </a:r>
+          </a:p>
+          <a:p>
+            <a:r>
+              <a:rPr lang="en-US" dirty="0" smtClean="0"/>
+              <a:t>Supplements JDK functionality</a:t>
+            </a:r>
+          </a:p>
+          <a:p>
+            <a:r>
+              <a:rPr lang="en-US" dirty="0" smtClean="0"/>
+              <a:t>Support for collections, concurrency, I/O</a:t>
+            </a:r>
+          </a:p>
+        </p:txBody>
+      </p:sp>
+    </p:spTree>
+    <p:extLst>
+      <p:ext uri="{BB962C8B-B14F-4D97-AF65-F5344CB8AC3E}">
+        <p14:creationId xmlns:p14="http://schemas.microsoft.com/office/powerpoint/2010/main" val="225452394"/>
+      </p:ext>
+    </p:extLst>
+  </p:cSld>
+  <p:clrMapOvr>
+    <a:masterClrMapping/>
+  </p:clrMapOvr>
+</p:sld>
+</file>
+
+<file path=ppt/slides/slide3.xml><?xml version="1.0" encoding="utf-8"?>
+<p:sld xmlns:a="http://schemas.openxmlformats.org/drawingml/2006/main" xmlns:r="http://schemas.openxmlformats.org/officeDocument/2006/relationships" xmlns:p="http://schemas.openxmlformats.org/presentationml/2006/main">
+  <p:cSld>
+    <p:spTree>
+      <p:nvGrpSpPr>
+        <p:cNvPr id="1" name=""/>
+        <p:cNvGrpSpPr/>
+        <p:nvPr/>
+      </p:nvGrpSpPr>
+      <p:grpSpPr>
+        <a:xfrm>
+          <a:off x="0" y="0"/>
+          <a:ext cx="0" cy="0"/>
+          <a:chOff x="0" y="0"/>
+          <a:chExt cx="0" cy="0"/>
+        </a:xfrm>
+      </p:grpSpPr>
+      <p:sp>
+        <p:nvSpPr>
+          <p:cNvPr id="2" name="Title 1"/>
+          <p:cNvSpPr>
+            <a:spLocks noGrp="1"/>
+          </p:cNvSpPr>
+          <p:nvPr>
+            <p:ph type="title"/>
+          </p:nvPr>
+        </p:nvSpPr>
+        <p:spPr/>
+        <p:txBody>
+          <a:bodyPr/>
+          <a:lstStyle/>
+          <a:p>
+            <a:r>
+              <a:rPr lang="en-US" dirty="0" smtClean="0"/>
+              <a:t>Guava Packaging</a:t>
+            </a:r>
+            <a:endParaRPr lang="en-US" dirty="0"/>
+          </a:p>
+        </p:txBody>
+      </p:sp>
+      <p:sp>
+        <p:nvSpPr>
+          <p:cNvPr id="3" name="Content Placeholder 2"/>
+          <p:cNvSpPr>
+            <a:spLocks noGrp="1"/>
+          </p:cNvSpPr>
+          <p:nvPr>
+            <p:ph idx="1"/>
+          </p:nvPr>
+        </p:nvSpPr>
+        <p:spPr>
+          <a:xfrm>
+            <a:off x="549275" y="1861693"/>
+            <a:ext cx="8042276" cy="2816935"/>
+          </a:xfrm>
+        </p:spPr>
+        <p:txBody>
+          <a:bodyPr numCol="2"/>
+          <a:lstStyle/>
+          <a:p>
+            <a:r>
+              <a:rPr lang="en-US" dirty="0">
+                <a:latin typeface="Courier"/>
+                <a:cs typeface="Courier"/>
+              </a:rPr>
+              <a:t>a</a:t>
+            </a:r>
+            <a:r>
+              <a:rPr lang="en-US" dirty="0" smtClean="0">
+                <a:latin typeface="Courier"/>
+                <a:cs typeface="Courier"/>
+              </a:rPr>
+              <a:t>nnotations</a:t>
+            </a:r>
+          </a:p>
+          <a:p>
+            <a:r>
+              <a:rPr lang="en-US" b="1" i="1" dirty="0" smtClean="0">
+                <a:latin typeface="Courier"/>
+                <a:cs typeface="Courier"/>
+              </a:rPr>
+              <a:t>base</a:t>
+            </a:r>
+            <a:endParaRPr lang="en-US" b="1" i="1" dirty="0"/>
+          </a:p>
+          <a:p>
+            <a:r>
+              <a:rPr lang="en-US" dirty="0" err="1" smtClean="0">
+                <a:latin typeface="Courier"/>
+                <a:cs typeface="Courier"/>
+              </a:rPr>
+              <a:t>base.internal</a:t>
+            </a:r>
+            <a:endParaRPr lang="en-US" dirty="0"/>
+          </a:p>
+          <a:p>
+            <a:r>
+              <a:rPr lang="en-US" b="1" i="1" dirty="0" smtClean="0">
+                <a:latin typeface="Courier"/>
+                <a:cs typeface="Courier"/>
+              </a:rPr>
+              <a:t>collect</a:t>
+            </a:r>
+            <a:endParaRPr lang="en-US" b="1" i="1" dirty="0" smtClean="0"/>
+          </a:p>
+          <a:p>
+            <a:r>
+              <a:rPr lang="en-US" dirty="0" err="1" smtClean="0">
+                <a:latin typeface="Courier"/>
+                <a:cs typeface="Courier"/>
+              </a:rPr>
+              <a:t>io</a:t>
+            </a:r>
+            <a:endParaRPr lang="en-US" dirty="0" smtClean="0"/>
+          </a:p>
+          <a:p>
+            <a:r>
+              <a:rPr lang="en-US" dirty="0" smtClean="0">
+                <a:latin typeface="Courier"/>
+                <a:cs typeface="Courier"/>
+              </a:rPr>
+              <a:t>net</a:t>
+            </a:r>
+            <a:endParaRPr lang="en-US" dirty="0" smtClean="0"/>
+          </a:p>
+          <a:p>
+            <a:r>
+              <a:rPr lang="en-US" dirty="0" smtClean="0">
+                <a:latin typeface="Courier"/>
+                <a:cs typeface="Courier"/>
+              </a:rPr>
+              <a:t>primitives</a:t>
+            </a:r>
+          </a:p>
+          <a:p>
+            <a:r>
+              <a:rPr lang="en-US" b="1" i="1" dirty="0" err="1" smtClean="0">
+                <a:latin typeface="Courier"/>
+                <a:cs typeface="Courier"/>
+              </a:rPr>
+              <a:t>util.conncurrent</a:t>
+            </a:r>
+            <a:endParaRPr lang="en-US" b="1" i="1" dirty="0" smtClean="0"/>
+          </a:p>
+        </p:txBody>
+      </p:sp>
+    </p:spTree>
+    <p:extLst>
+      <p:ext uri="{BB962C8B-B14F-4D97-AF65-F5344CB8AC3E}">
+        <p14:creationId xmlns:p14="http://schemas.microsoft.com/office/powerpoint/2010/main" val="4149738189"/>
       </p:ext>
     </p:extLst>
   </p:cSld>

</xml_diff>

<commit_message>
Incremental commit - started work on collect package.
</commit_message>
<xml_diff>
--- a/JavaMUG - Guava.pptx
+++ b/JavaMUG - Guava.pptx
@@ -5,7 +5,7 @@
     <p:sldMasterId id="2147483660" r:id="rId1"/>
   </p:sldMasterIdLst>
   <p:notesMasterIdLst>
-    <p:notesMasterId r:id="rId47"/>
+    <p:notesMasterId r:id="rId51"/>
   </p:notesMasterIdLst>
   <p:sldIdLst>
     <p:sldId id="256" r:id="rId2"/>
@@ -53,6 +53,10 @@
     <p:sldId id="307" r:id="rId44"/>
     <p:sldId id="308" r:id="rId45"/>
     <p:sldId id="310" r:id="rId46"/>
+    <p:sldId id="311" r:id="rId47"/>
+    <p:sldId id="312" r:id="rId48"/>
+    <p:sldId id="313" r:id="rId49"/>
+    <p:sldId id="314" r:id="rId50"/>
   </p:sldIdLst>
   <p:sldSz cx="9144000" cy="6858000" type="screen4x3"/>
   <p:notesSz cx="6858000" cy="9144000"/>
@@ -236,7 +240,7 @@
           <a:p>
             <a:fld id="{8D7C17D1-822C-D245-8E59-CC30A49789B4}" type="datetimeFigureOut">
               <a:rPr lang="en-US" smtClean="0"/>
-              <a:t>9/3/11</a:t>
+              <a:t>9/6/11</a:t>
             </a:fld>
             <a:endParaRPr lang="en-US"/>
           </a:p>
@@ -871,7 +875,7 @@
           <a:p>
             <a:fld id="{B01F9CA3-105E-4857-9057-6DB6197DA786}" type="datetimeFigureOut">
               <a:rPr lang="en-US" smtClean="0"/>
-              <a:t>9/3/11</a:t>
+              <a:t>9/6/11</a:t>
             </a:fld>
             <a:endParaRPr lang="en-US"/>
           </a:p>
@@ -1063,7 +1067,7 @@
           <a:p>
             <a:fld id="{B01F9CA3-105E-4857-9057-6DB6197DA786}" type="datetimeFigureOut">
               <a:rPr lang="en-US" smtClean="0"/>
-              <a:t>9/3/11</a:t>
+              <a:t>9/6/11</a:t>
             </a:fld>
             <a:endParaRPr lang="en-US"/>
           </a:p>
@@ -1360,7 +1364,7 @@
           <a:p>
             <a:fld id="{B01F9CA3-105E-4857-9057-6DB6197DA786}" type="datetimeFigureOut">
               <a:rPr lang="en-US" smtClean="0"/>
-              <a:t>9/3/11</a:t>
+              <a:t>9/6/11</a:t>
             </a:fld>
             <a:endParaRPr lang="en-US"/>
           </a:p>
@@ -1567,7 +1571,7 @@
           <a:p>
             <a:fld id="{B01F9CA3-105E-4857-9057-6DB6197DA786}" type="datetimeFigureOut">
               <a:rPr lang="en-US" smtClean="0"/>
-              <a:t>9/3/11</a:t>
+              <a:t>9/6/11</a:t>
             </a:fld>
             <a:endParaRPr lang="en-US"/>
           </a:p>
@@ -1764,7 +1768,7 @@
           <a:p>
             <a:fld id="{B01F9CA3-105E-4857-9057-6DB6197DA786}" type="datetimeFigureOut">
               <a:rPr lang="en-US" smtClean="0"/>
-              <a:t>9/3/11</a:t>
+              <a:t>9/6/11</a:t>
             </a:fld>
             <a:endParaRPr lang="en-US"/>
           </a:p>
@@ -2006,7 +2010,7 @@
           <a:p>
             <a:fld id="{B01F9CA3-105E-4857-9057-6DB6197DA786}" type="datetimeFigureOut">
               <a:rPr lang="en-US" smtClean="0"/>
-              <a:t>9/3/11</a:t>
+              <a:t>9/6/11</a:t>
             </a:fld>
             <a:endParaRPr lang="en-US"/>
           </a:p>
@@ -2329,7 +2333,7 @@
           <a:p>
             <a:fld id="{B01F9CA3-105E-4857-9057-6DB6197DA786}" type="datetimeFigureOut">
               <a:rPr lang="en-US" smtClean="0"/>
-              <a:t>9/3/11</a:t>
+              <a:t>9/6/11</a:t>
             </a:fld>
             <a:endParaRPr lang="en-US"/>
           </a:p>
@@ -2683,7 +2687,7 @@
           <a:p>
             <a:fld id="{B01F9CA3-105E-4857-9057-6DB6197DA786}" type="datetimeFigureOut">
               <a:rPr lang="en-US" smtClean="0"/>
-              <a:t>9/3/11</a:t>
+              <a:t>9/6/11</a:t>
             </a:fld>
             <a:endParaRPr lang="en-US"/>
           </a:p>
@@ -3195,7 +3199,7 @@
           <a:p>
             <a:fld id="{B01F9CA3-105E-4857-9057-6DB6197DA786}" type="datetimeFigureOut">
               <a:rPr lang="en-US" smtClean="0"/>
-              <a:t>9/3/11</a:t>
+              <a:t>9/6/11</a:t>
             </a:fld>
             <a:endParaRPr lang="en-US"/>
           </a:p>
@@ -3308,7 +3312,7 @@
           <a:p>
             <a:fld id="{B01F9CA3-105E-4857-9057-6DB6197DA786}" type="datetimeFigureOut">
               <a:rPr lang="en-US" smtClean="0"/>
-              <a:t>9/3/11</a:t>
+              <a:t>9/6/11</a:t>
             </a:fld>
             <a:endParaRPr lang="en-US"/>
           </a:p>
@@ -3398,7 +3402,7 @@
           <a:p>
             <a:fld id="{B01F9CA3-105E-4857-9057-6DB6197DA786}" type="datetimeFigureOut">
               <a:rPr lang="en-US" smtClean="0"/>
-              <a:t>9/3/11</a:t>
+              <a:t>9/6/11</a:t>
             </a:fld>
             <a:endParaRPr lang="en-US"/>
           </a:p>
@@ -3708,7 +3712,7 @@
           <a:p>
             <a:fld id="{B01F9CA3-105E-4857-9057-6DB6197DA786}" type="datetimeFigureOut">
               <a:rPr lang="en-US" smtClean="0"/>
-              <a:t>9/3/11</a:t>
+              <a:t>9/6/11</a:t>
             </a:fld>
             <a:endParaRPr lang="en-US"/>
           </a:p>
@@ -3942,7 +3946,7 @@
           <a:p>
             <a:fld id="{B01F9CA3-105E-4857-9057-6DB6197DA786}" type="datetimeFigureOut">
               <a:rPr lang="en-US" smtClean="0"/>
-              <a:t>9/3/11</a:t>
+              <a:t>9/6/11</a:t>
             </a:fld>
             <a:endParaRPr lang="en-US"/>
           </a:p>
@@ -9732,22 +9736,15 @@
                 <a:latin typeface="News Gothic MT"/>
                 <a:cs typeface="News Gothic MT"/>
               </a:rPr>
-              <a:t>Utility class for converting between various ASCII ca</a:t>
-            </a:r>
+              <a:t>Utility class for converting between various ASCII case formats.</a:t>
+            </a:r>
+          </a:p>
+          <a:p>
             <a:r>
               <a:rPr lang="en-US" sz="3000" dirty="0" smtClean="0">
                 <a:latin typeface="News Gothic MT"/>
                 <a:cs typeface="News Gothic MT"/>
               </a:rPr>
-              <a:t>se formats.</a:t>
-            </a:r>
-          </a:p>
-          <a:p>
-            <a:r>
-              <a:rPr lang="en-US" sz="3000" dirty="0" smtClean="0">
-                <a:latin typeface="News Gothic MT"/>
-                <a:cs typeface="News Gothic MT"/>
-              </a:rPr>
               <a:t>Formats supported:</a:t>
             </a:r>
           </a:p>
@@ -9842,10 +9839,6 @@
               </a:rPr>
               <a:t>Upper underscore (e.g. FOO_BAR)</a:t>
             </a:r>
-            <a:endParaRPr lang="en-US" sz="2800" dirty="0" smtClean="0">
-              <a:latin typeface="News Gothic MT"/>
-              <a:cs typeface="News Gothic MT"/>
-            </a:endParaRPr>
           </a:p>
           <a:p>
             <a:pPr lvl="1"/>
@@ -10658,10 +10651,6 @@
               </a:rPr>
               <a:t>Trim leading, trailing or both</a:t>
             </a:r>
-            <a:endParaRPr lang="en-US" sz="2800" dirty="0" smtClean="0">
-              <a:latin typeface="News Gothic MT"/>
-              <a:cs typeface="News Gothic MT"/>
-            </a:endParaRPr>
           </a:p>
         </p:txBody>
       </p:sp>
@@ -13151,27 +13140,7 @@
                 <a:latin typeface="Monaco"/>
                 <a:cs typeface="Monaco"/>
               </a:rPr>
-              <a:t>implements</a:t>
-            </a:r>
-            <a:r>
-              <a:rPr lang="en-US" sz="2000" b="1" i="1" dirty="0">
-                <a:solidFill>
-                  <a:srgbClr val="586215"/>
-                </a:solidFill>
-                <a:latin typeface="Monaco"/>
-                <a:cs typeface="Monaco"/>
-              </a:rPr>
-              <a:t> </a:t>
-            </a:r>
-            <a:r>
-              <a:rPr lang="en-US" sz="2000" b="1" i="1" dirty="0">
-                <a:solidFill>
-                  <a:srgbClr val="586215"/>
-                </a:solidFill>
-                <a:latin typeface="Monaco"/>
-                <a:cs typeface="Monaco"/>
-              </a:rPr>
-              <a:t>Predicate&lt;Integer&gt; </a:t>
+              <a:t>implements Predicate&lt;Integer&gt; </a:t>
             </a:r>
             <a:r>
               <a:rPr lang="en-US" sz="2000" dirty="0">
@@ -13838,27 +13807,7 @@
                 <a:latin typeface="Monaco"/>
                 <a:cs typeface="Monaco"/>
               </a:rPr>
-              <a:t>implements</a:t>
-            </a:r>
-            <a:r>
-              <a:rPr lang="en-US" sz="2000" b="1" i="1" dirty="0">
-                <a:solidFill>
-                  <a:srgbClr val="586215"/>
-                </a:solidFill>
-                <a:latin typeface="Monaco"/>
-                <a:cs typeface="Monaco"/>
-              </a:rPr>
-              <a:t> </a:t>
-            </a:r>
-            <a:r>
-              <a:rPr lang="en-US" sz="2000" b="1" i="1" dirty="0">
-                <a:solidFill>
-                  <a:srgbClr val="586215"/>
-                </a:solidFill>
-                <a:latin typeface="Monaco"/>
-                <a:cs typeface="Monaco"/>
-              </a:rPr>
-              <a:t>Predicate&lt;String&gt; </a:t>
+              <a:t>implements Predicate&lt;String&gt; </a:t>
             </a:r>
             <a:r>
               <a:rPr lang="en-US" sz="2000" dirty="0">
@@ -14894,10 +14843,6 @@
               </a:rPr>
               <a:t>Determines an output for a given input.</a:t>
             </a:r>
-            <a:endParaRPr lang="en-US" sz="3000" dirty="0" smtClean="0">
-              <a:latin typeface="News Gothic MT"/>
-              <a:cs typeface="News Gothic MT"/>
-            </a:endParaRPr>
           </a:p>
           <a:p>
             <a:r>
@@ -16039,21 +15984,7 @@
                 <a:latin typeface="News Gothic MT"/>
                 <a:cs typeface="News Gothic MT"/>
               </a:rPr>
-              <a:t>for </a:t>
-            </a:r>
-            <a:r>
-              <a:rPr lang="en-US" sz="3000" dirty="0">
-                <a:latin typeface="News Gothic MT"/>
-                <a:cs typeface="News Gothic MT"/>
-              </a:rPr>
-              <a:t>chaining </a:t>
-            </a:r>
-            <a:r>
-              <a:rPr lang="en-US" sz="3000" dirty="0">
-                <a:latin typeface="News Gothic MT"/>
-                <a:cs typeface="News Gothic MT"/>
-              </a:rPr>
-              <a:t>(composing) </a:t>
+              <a:t>for chaining (composing) </a:t>
             </a:r>
             <a:r>
               <a:rPr lang="en-US" sz="3000" dirty="0" smtClean="0">
@@ -16208,6 +16139,2090 @@
     <p:extLst>
       <p:ext uri="{BB962C8B-B14F-4D97-AF65-F5344CB8AC3E}">
         <p14:creationId xmlns:p14="http://schemas.microsoft.com/office/powerpoint/2010/main" val="4235736043"/>
+      </p:ext>
+    </p:extLst>
+  </p:cSld>
+  <p:clrMapOvr>
+    <a:masterClrMapping/>
+  </p:clrMapOvr>
+  <p:timing>
+    <p:tnLst>
+      <p:par>
+        <p:cTn xmlns:p14="http://schemas.microsoft.com/office/powerpoint/2010/main" id="1" dur="indefinite" restart="never" nodeType="tmRoot"/>
+      </p:par>
+    </p:tnLst>
+  </p:timing>
+</p:sld>
+</file>
+
+<file path=ppt/slides/slide46.xml><?xml version="1.0" encoding="utf-8"?>
+<p:sld xmlns:a="http://schemas.openxmlformats.org/drawingml/2006/main" xmlns:r="http://schemas.openxmlformats.org/officeDocument/2006/relationships" xmlns:p="http://schemas.openxmlformats.org/presentationml/2006/main">
+  <p:cSld>
+    <p:spTree>
+      <p:nvGrpSpPr>
+        <p:cNvPr id="1" name=""/>
+        <p:cNvGrpSpPr/>
+        <p:nvPr/>
+      </p:nvGrpSpPr>
+      <p:grpSpPr>
+        <a:xfrm>
+          <a:off x="0" y="0"/>
+          <a:ext cx="0" cy="0"/>
+          <a:chOff x="0" y="0"/>
+          <a:chExt cx="0" cy="0"/>
+        </a:xfrm>
+      </p:grpSpPr>
+      <p:sp>
+        <p:nvSpPr>
+          <p:cNvPr id="2" name="Title 1"/>
+          <p:cNvSpPr>
+            <a:spLocks noGrp="1"/>
+          </p:cNvSpPr>
+          <p:nvPr>
+            <p:ph type="title"/>
+          </p:nvPr>
+        </p:nvSpPr>
+        <p:spPr/>
+        <p:txBody>
+          <a:bodyPr/>
+          <a:lstStyle/>
+          <a:p>
+            <a:r>
+              <a:rPr lang="en-US" sz="4400" dirty="0" smtClean="0"/>
+              <a:t>Immutable Collections</a:t>
+            </a:r>
+            <a:endParaRPr lang="en-US" sz="4400" dirty="0"/>
+          </a:p>
+        </p:txBody>
+      </p:sp>
+      <p:sp>
+        <p:nvSpPr>
+          <p:cNvPr id="3" name="Content Placeholder 2"/>
+          <p:cNvSpPr>
+            <a:spLocks noGrp="1"/>
+          </p:cNvSpPr>
+          <p:nvPr>
+            <p:ph idx="1"/>
+          </p:nvPr>
+        </p:nvSpPr>
+        <p:spPr>
+          <a:xfrm>
+            <a:off x="549275" y="1672167"/>
+            <a:ext cx="8042276" cy="635000"/>
+          </a:xfrm>
+        </p:spPr>
+        <p:txBody>
+          <a:bodyPr numCol="1">
+            <a:normAutofit/>
+          </a:bodyPr>
+          <a:lstStyle/>
+          <a:p>
+            <a:r>
+              <a:rPr lang="en-US" sz="3000" dirty="0" smtClean="0">
+                <a:latin typeface="News Gothic MT"/>
+                <a:cs typeface="News Gothic MT"/>
+              </a:rPr>
+              <a:t>Provides immutable forms of:</a:t>
+            </a:r>
+          </a:p>
+          <a:p>
+            <a:pPr marL="349250" lvl="1" indent="0">
+              <a:buNone/>
+            </a:pPr>
+            <a:endParaRPr lang="en-US" sz="2800" dirty="0" smtClean="0">
+              <a:latin typeface="News Gothic MT"/>
+              <a:cs typeface="News Gothic MT"/>
+            </a:endParaRPr>
+          </a:p>
+          <a:p>
+            <a:pPr lvl="1"/>
+            <a:endParaRPr lang="en-US" sz="2800" dirty="0">
+              <a:latin typeface="News Gothic MT"/>
+              <a:cs typeface="News Gothic MT"/>
+            </a:endParaRPr>
+          </a:p>
+          <a:p>
+            <a:pPr lvl="1"/>
+            <a:endParaRPr lang="en-US" sz="2800" dirty="0" smtClean="0">
+              <a:latin typeface="News Gothic MT"/>
+              <a:cs typeface="News Gothic MT"/>
+            </a:endParaRPr>
+          </a:p>
+          <a:p>
+            <a:pPr lvl="1"/>
+            <a:endParaRPr lang="en-US" sz="2800" dirty="0">
+              <a:latin typeface="News Gothic MT"/>
+              <a:cs typeface="News Gothic MT"/>
+            </a:endParaRPr>
+          </a:p>
+          <a:p>
+            <a:pPr lvl="1"/>
+            <a:endParaRPr lang="en-US" sz="2800" dirty="0" smtClean="0">
+              <a:latin typeface="News Gothic MT"/>
+              <a:cs typeface="News Gothic MT"/>
+            </a:endParaRPr>
+          </a:p>
+          <a:p>
+            <a:pPr lvl="1"/>
+            <a:endParaRPr lang="en-US" sz="2800" dirty="0">
+              <a:latin typeface="News Gothic MT"/>
+              <a:cs typeface="News Gothic MT"/>
+            </a:endParaRPr>
+          </a:p>
+          <a:p>
+            <a:pPr lvl="1"/>
+            <a:endParaRPr lang="en-US" sz="2800" dirty="0" smtClean="0">
+              <a:latin typeface="News Gothic MT"/>
+              <a:cs typeface="News Gothic MT"/>
+            </a:endParaRPr>
+          </a:p>
+        </p:txBody>
+      </p:sp>
+      <p:sp>
+        <p:nvSpPr>
+          <p:cNvPr id="4" name="Content Placeholder 2"/>
+          <p:cNvSpPr txBox="1">
+            <a:spLocks/>
+          </p:cNvSpPr>
+          <p:nvPr/>
+        </p:nvSpPr>
+        <p:spPr>
+          <a:xfrm>
+            <a:off x="549275" y="2307167"/>
+            <a:ext cx="8042276" cy="1536435"/>
+          </a:xfrm>
+          <a:prstGeom prst="rect">
+            <a:avLst/>
+          </a:prstGeom>
+        </p:spPr>
+        <p:txBody>
+          <a:bodyPr vert="horz" lIns="91440" tIns="45720" rIns="91440" bIns="45720" numCol="2" rtlCol="0">
+            <a:normAutofit fontScale="85000" lnSpcReduction="10000"/>
+          </a:bodyPr>
+          <a:lstStyle>
+            <a:lvl1pPr marL="349250" indent="-349250" algn="l" defTabSz="914400" rtl="0" eaLnBrk="1" latinLnBrk="0" hangingPunct="1">
+              <a:spcBef>
+                <a:spcPts val="2000"/>
+              </a:spcBef>
+              <a:buClr>
+                <a:schemeClr val="accent1">
+                  <a:lumMod val="60000"/>
+                  <a:lumOff val="40000"/>
+                </a:schemeClr>
+              </a:buClr>
+              <a:buSzPct val="110000"/>
+              <a:buFont typeface="Wingdings 2" pitchFamily="18" charset="2"/>
+              <a:buChar char=""/>
+              <a:defRPr sz="2400" kern="1200">
+                <a:solidFill>
+                  <a:schemeClr val="tx1">
+                    <a:lumMod val="65000"/>
+                    <a:lumOff val="35000"/>
+                  </a:schemeClr>
+                </a:solidFill>
+                <a:latin typeface="+mn-lt"/>
+                <a:ea typeface="+mn-ea"/>
+                <a:cs typeface="+mn-cs"/>
+              </a:defRPr>
+            </a:lvl1pPr>
+            <a:lvl2pPr marL="685800" indent="-336550" algn="l" defTabSz="914400" rtl="0" eaLnBrk="1" latinLnBrk="0" hangingPunct="1">
+              <a:spcBef>
+                <a:spcPts val="600"/>
+              </a:spcBef>
+              <a:buClr>
+                <a:schemeClr val="accent1">
+                  <a:lumMod val="75000"/>
+                </a:schemeClr>
+              </a:buClr>
+              <a:buSzPct val="110000"/>
+              <a:buFont typeface="Wingdings 2" pitchFamily="18" charset="2"/>
+              <a:buChar char=""/>
+              <a:defRPr sz="2200" kern="1200">
+                <a:solidFill>
+                  <a:schemeClr val="tx1">
+                    <a:lumMod val="65000"/>
+                    <a:lumOff val="35000"/>
+                  </a:schemeClr>
+                </a:solidFill>
+                <a:latin typeface="+mn-lt"/>
+                <a:ea typeface="+mn-ea"/>
+                <a:cs typeface="+mn-cs"/>
+              </a:defRPr>
+            </a:lvl2pPr>
+            <a:lvl3pPr marL="968375" indent="-282575" algn="l" defTabSz="914400" rtl="0" eaLnBrk="1" latinLnBrk="0" hangingPunct="1">
+              <a:spcBef>
+                <a:spcPts val="600"/>
+              </a:spcBef>
+              <a:buClr>
+                <a:schemeClr val="accent1">
+                  <a:lumMod val="60000"/>
+                  <a:lumOff val="40000"/>
+                </a:schemeClr>
+              </a:buClr>
+              <a:buSzPct val="110000"/>
+              <a:buFont typeface="Wingdings 2" pitchFamily="18" charset="2"/>
+              <a:buChar char=""/>
+              <a:defRPr sz="2000" kern="1200">
+                <a:solidFill>
+                  <a:schemeClr val="tx1">
+                    <a:lumMod val="65000"/>
+                    <a:lumOff val="35000"/>
+                  </a:schemeClr>
+                </a:solidFill>
+                <a:latin typeface="+mn-lt"/>
+                <a:ea typeface="+mn-ea"/>
+                <a:cs typeface="+mn-cs"/>
+              </a:defRPr>
+            </a:lvl3pPr>
+            <a:lvl4pPr marL="1263650" indent="-295275" algn="l" defTabSz="914400" rtl="0" eaLnBrk="1" latinLnBrk="0" hangingPunct="1">
+              <a:spcBef>
+                <a:spcPts val="600"/>
+              </a:spcBef>
+              <a:buClr>
+                <a:schemeClr val="accent1">
+                  <a:lumMod val="75000"/>
+                </a:schemeClr>
+              </a:buClr>
+              <a:buSzPct val="110000"/>
+              <a:buFont typeface="Wingdings 2" pitchFamily="18" charset="2"/>
+              <a:buChar char=""/>
+              <a:defRPr sz="1800" kern="1200">
+                <a:solidFill>
+                  <a:schemeClr val="tx1">
+                    <a:lumMod val="65000"/>
+                    <a:lumOff val="35000"/>
+                  </a:schemeClr>
+                </a:solidFill>
+                <a:latin typeface="+mn-lt"/>
+                <a:ea typeface="+mn-ea"/>
+                <a:cs typeface="+mn-cs"/>
+              </a:defRPr>
+            </a:lvl4pPr>
+            <a:lvl5pPr marL="1546225" indent="-282575" algn="l" defTabSz="914400" rtl="0" eaLnBrk="1" latinLnBrk="0" hangingPunct="1">
+              <a:spcBef>
+                <a:spcPts val="600"/>
+              </a:spcBef>
+              <a:buClr>
+                <a:schemeClr val="accent1">
+                  <a:lumMod val="60000"/>
+                  <a:lumOff val="40000"/>
+                </a:schemeClr>
+              </a:buClr>
+              <a:buSzPct val="110000"/>
+              <a:buFont typeface="Wingdings 2" pitchFamily="18" charset="2"/>
+              <a:buChar char=""/>
+              <a:defRPr sz="1800" kern="1200">
+                <a:solidFill>
+                  <a:schemeClr val="tx1">
+                    <a:lumMod val="65000"/>
+                    <a:lumOff val="35000"/>
+                  </a:schemeClr>
+                </a:solidFill>
+                <a:latin typeface="+mn-lt"/>
+                <a:ea typeface="+mn-ea"/>
+                <a:cs typeface="+mn-cs"/>
+              </a:defRPr>
+            </a:lvl5pPr>
+            <a:lvl6pPr marL="1828800" indent="-282575" algn="l" defTabSz="914400" rtl="0" eaLnBrk="1" latinLnBrk="0" hangingPunct="1">
+              <a:spcBef>
+                <a:spcPct val="20000"/>
+              </a:spcBef>
+              <a:buClr>
+                <a:schemeClr val="accent2"/>
+              </a:buClr>
+              <a:buSzPct val="110000"/>
+              <a:buFont typeface="Wingdings 2" pitchFamily="18" charset="2"/>
+              <a:buChar char=""/>
+              <a:defRPr lang="en-US" sz="1800" kern="1200" dirty="0" smtClean="0">
+                <a:solidFill>
+                  <a:schemeClr val="tx1">
+                    <a:lumMod val="65000"/>
+                    <a:lumOff val="35000"/>
+                  </a:schemeClr>
+                </a:solidFill>
+                <a:latin typeface="+mn-lt"/>
+                <a:ea typeface="+mn-ea"/>
+                <a:cs typeface="+mn-cs"/>
+              </a:defRPr>
+            </a:lvl6pPr>
+            <a:lvl7pPr marL="2117725" indent="-282575" algn="l" defTabSz="914400" rtl="0" eaLnBrk="1" latinLnBrk="0" hangingPunct="1">
+              <a:spcBef>
+                <a:spcPct val="20000"/>
+              </a:spcBef>
+              <a:buClr>
+                <a:schemeClr val="accent1">
+                  <a:lumMod val="60000"/>
+                  <a:lumOff val="40000"/>
+                </a:schemeClr>
+              </a:buClr>
+              <a:buSzPct val="110000"/>
+              <a:buFont typeface="Wingdings 2" pitchFamily="18" charset="2"/>
+              <a:buChar char=""/>
+              <a:defRPr lang="en-US" sz="1800" kern="1200" dirty="0" smtClean="0">
+                <a:solidFill>
+                  <a:schemeClr val="tx1">
+                    <a:lumMod val="65000"/>
+                    <a:lumOff val="35000"/>
+                  </a:schemeClr>
+                </a:solidFill>
+                <a:latin typeface="+mn-lt"/>
+                <a:ea typeface="+mn-ea"/>
+                <a:cs typeface="+mn-cs"/>
+              </a:defRPr>
+            </a:lvl7pPr>
+            <a:lvl8pPr marL="2398713" indent="-282575" algn="l" defTabSz="914400" rtl="0" eaLnBrk="1" latinLnBrk="0" hangingPunct="1">
+              <a:spcBef>
+                <a:spcPct val="20000"/>
+              </a:spcBef>
+              <a:buClr>
+                <a:schemeClr val="accent2"/>
+              </a:buClr>
+              <a:buSzPct val="110000"/>
+              <a:buFont typeface="Wingdings 2" pitchFamily="18" charset="2"/>
+              <a:buChar char=""/>
+              <a:defRPr lang="en-US" sz="1800" kern="1200" dirty="0" smtClean="0">
+                <a:solidFill>
+                  <a:schemeClr val="tx1">
+                    <a:lumMod val="65000"/>
+                    <a:lumOff val="35000"/>
+                  </a:schemeClr>
+                </a:solidFill>
+                <a:latin typeface="+mn-lt"/>
+                <a:ea typeface="+mn-ea"/>
+                <a:cs typeface="+mn-cs"/>
+              </a:defRPr>
+            </a:lvl8pPr>
+            <a:lvl9pPr marL="2689225" indent="-282575" algn="l" defTabSz="914400" rtl="0" eaLnBrk="1" latinLnBrk="0" hangingPunct="1">
+              <a:spcBef>
+                <a:spcPct val="20000"/>
+              </a:spcBef>
+              <a:buClr>
+                <a:schemeClr val="accent1">
+                  <a:lumMod val="60000"/>
+                  <a:lumOff val="40000"/>
+                </a:schemeClr>
+              </a:buClr>
+              <a:buSzPct val="110000"/>
+              <a:buFont typeface="Wingdings 2" pitchFamily="18" charset="2"/>
+              <a:buChar char=""/>
+              <a:defRPr lang="en-US" sz="1800" kern="1200" dirty="0">
+                <a:solidFill>
+                  <a:schemeClr val="tx1">
+                    <a:lumMod val="65000"/>
+                    <a:lumOff val="35000"/>
+                  </a:schemeClr>
+                </a:solidFill>
+                <a:latin typeface="+mn-lt"/>
+                <a:ea typeface="+mn-ea"/>
+                <a:cs typeface="+mn-cs"/>
+              </a:defRPr>
+            </a:lvl9pPr>
+          </a:lstStyle>
+          <a:p>
+            <a:pPr lvl="1"/>
+            <a:r>
+              <a:rPr lang="en-US" sz="2800" dirty="0" smtClean="0">
+                <a:latin typeface="News Gothic MT"/>
+                <a:cs typeface="News Gothic MT"/>
+              </a:rPr>
+              <a:t>List</a:t>
+            </a:r>
+          </a:p>
+          <a:p>
+            <a:pPr lvl="1"/>
+            <a:r>
+              <a:rPr lang="en-US" sz="2800" dirty="0" smtClean="0">
+                <a:latin typeface="News Gothic MT"/>
+                <a:cs typeface="News Gothic MT"/>
+              </a:rPr>
+              <a:t>Set</a:t>
+            </a:r>
+          </a:p>
+          <a:p>
+            <a:pPr lvl="1"/>
+            <a:r>
+              <a:rPr lang="en-US" sz="2800" dirty="0" smtClean="0">
+                <a:latin typeface="News Gothic MT"/>
+                <a:cs typeface="News Gothic MT"/>
+              </a:rPr>
+              <a:t>Map</a:t>
+            </a:r>
+          </a:p>
+          <a:p>
+            <a:pPr lvl="1"/>
+            <a:r>
+              <a:rPr lang="en-US" sz="2800" dirty="0" smtClean="0">
+                <a:latin typeface="News Gothic MT"/>
+                <a:cs typeface="News Gothic MT"/>
+              </a:rPr>
+              <a:t>Collection</a:t>
+            </a:r>
+          </a:p>
+          <a:p>
+            <a:pPr lvl="1"/>
+            <a:r>
+              <a:rPr lang="en-US" sz="2800" dirty="0" err="1" smtClean="0">
+                <a:latin typeface="News Gothic MT"/>
+                <a:cs typeface="News Gothic MT"/>
+              </a:rPr>
+              <a:t>SortedMap</a:t>
+            </a:r>
+            <a:endParaRPr lang="en-US" sz="2800" dirty="0" smtClean="0">
+              <a:latin typeface="News Gothic MT"/>
+              <a:cs typeface="News Gothic MT"/>
+            </a:endParaRPr>
+          </a:p>
+          <a:p>
+            <a:pPr lvl="1"/>
+            <a:r>
+              <a:rPr lang="en-US" sz="2800" dirty="0" err="1" smtClean="0">
+                <a:latin typeface="News Gothic MT"/>
+                <a:cs typeface="News Gothic MT"/>
+              </a:rPr>
+              <a:t>SortedSet</a:t>
+            </a:r>
+            <a:endParaRPr lang="en-US" sz="2800" dirty="0" smtClean="0">
+              <a:latin typeface="News Gothic MT"/>
+              <a:cs typeface="News Gothic MT"/>
+            </a:endParaRPr>
+          </a:p>
+          <a:p>
+            <a:pPr lvl="1"/>
+            <a:endParaRPr lang="en-US" sz="2800" dirty="0" smtClean="0">
+              <a:latin typeface="News Gothic MT"/>
+              <a:cs typeface="News Gothic MT"/>
+            </a:endParaRPr>
+          </a:p>
+          <a:p>
+            <a:pPr lvl="1"/>
+            <a:endParaRPr lang="en-US" sz="2800" dirty="0" smtClean="0">
+              <a:latin typeface="News Gothic MT"/>
+              <a:cs typeface="News Gothic MT"/>
+            </a:endParaRPr>
+          </a:p>
+          <a:p>
+            <a:pPr lvl="1"/>
+            <a:endParaRPr lang="en-US" sz="2800" dirty="0" smtClean="0">
+              <a:latin typeface="News Gothic MT"/>
+              <a:cs typeface="News Gothic MT"/>
+            </a:endParaRPr>
+          </a:p>
+          <a:p>
+            <a:pPr lvl="1"/>
+            <a:endParaRPr lang="en-US" sz="2800" dirty="0" smtClean="0">
+              <a:latin typeface="News Gothic MT"/>
+              <a:cs typeface="News Gothic MT"/>
+            </a:endParaRPr>
+          </a:p>
+          <a:p>
+            <a:pPr lvl="1"/>
+            <a:endParaRPr lang="en-US" sz="2800" dirty="0" smtClean="0">
+              <a:latin typeface="News Gothic MT"/>
+              <a:cs typeface="News Gothic MT"/>
+            </a:endParaRPr>
+          </a:p>
+        </p:txBody>
+      </p:sp>
+      <p:sp>
+        <p:nvSpPr>
+          <p:cNvPr id="6" name="Content Placeholder 2"/>
+          <p:cNvSpPr txBox="1">
+            <a:spLocks/>
+          </p:cNvSpPr>
+          <p:nvPr/>
+        </p:nvSpPr>
+        <p:spPr>
+          <a:xfrm>
+            <a:off x="549275" y="3746499"/>
+            <a:ext cx="8042276" cy="2434168"/>
+          </a:xfrm>
+          <a:prstGeom prst="rect">
+            <a:avLst/>
+          </a:prstGeom>
+        </p:spPr>
+        <p:txBody>
+          <a:bodyPr vert="horz" lIns="91440" tIns="45720" rIns="91440" bIns="45720" numCol="1" rtlCol="0">
+            <a:normAutofit/>
+          </a:bodyPr>
+          <a:lstStyle>
+            <a:lvl1pPr marL="349250" indent="-349250" algn="l" defTabSz="914400" rtl="0" eaLnBrk="1" latinLnBrk="0" hangingPunct="1">
+              <a:spcBef>
+                <a:spcPts val="2000"/>
+              </a:spcBef>
+              <a:buClr>
+                <a:schemeClr val="accent1">
+                  <a:lumMod val="60000"/>
+                  <a:lumOff val="40000"/>
+                </a:schemeClr>
+              </a:buClr>
+              <a:buSzPct val="110000"/>
+              <a:buFont typeface="Wingdings 2" pitchFamily="18" charset="2"/>
+              <a:buChar char=""/>
+              <a:defRPr sz="2400" kern="1200">
+                <a:solidFill>
+                  <a:schemeClr val="tx1">
+                    <a:lumMod val="65000"/>
+                    <a:lumOff val="35000"/>
+                  </a:schemeClr>
+                </a:solidFill>
+                <a:latin typeface="+mn-lt"/>
+                <a:ea typeface="+mn-ea"/>
+                <a:cs typeface="+mn-cs"/>
+              </a:defRPr>
+            </a:lvl1pPr>
+            <a:lvl2pPr marL="685800" indent="-336550" algn="l" defTabSz="914400" rtl="0" eaLnBrk="1" latinLnBrk="0" hangingPunct="1">
+              <a:spcBef>
+                <a:spcPts val="600"/>
+              </a:spcBef>
+              <a:buClr>
+                <a:schemeClr val="accent1">
+                  <a:lumMod val="75000"/>
+                </a:schemeClr>
+              </a:buClr>
+              <a:buSzPct val="110000"/>
+              <a:buFont typeface="Wingdings 2" pitchFamily="18" charset="2"/>
+              <a:buChar char=""/>
+              <a:defRPr sz="2200" kern="1200">
+                <a:solidFill>
+                  <a:schemeClr val="tx1">
+                    <a:lumMod val="65000"/>
+                    <a:lumOff val="35000"/>
+                  </a:schemeClr>
+                </a:solidFill>
+                <a:latin typeface="+mn-lt"/>
+                <a:ea typeface="+mn-ea"/>
+                <a:cs typeface="+mn-cs"/>
+              </a:defRPr>
+            </a:lvl2pPr>
+            <a:lvl3pPr marL="968375" indent="-282575" algn="l" defTabSz="914400" rtl="0" eaLnBrk="1" latinLnBrk="0" hangingPunct="1">
+              <a:spcBef>
+                <a:spcPts val="600"/>
+              </a:spcBef>
+              <a:buClr>
+                <a:schemeClr val="accent1">
+                  <a:lumMod val="60000"/>
+                  <a:lumOff val="40000"/>
+                </a:schemeClr>
+              </a:buClr>
+              <a:buSzPct val="110000"/>
+              <a:buFont typeface="Wingdings 2" pitchFamily="18" charset="2"/>
+              <a:buChar char=""/>
+              <a:defRPr sz="2000" kern="1200">
+                <a:solidFill>
+                  <a:schemeClr val="tx1">
+                    <a:lumMod val="65000"/>
+                    <a:lumOff val="35000"/>
+                  </a:schemeClr>
+                </a:solidFill>
+                <a:latin typeface="+mn-lt"/>
+                <a:ea typeface="+mn-ea"/>
+                <a:cs typeface="+mn-cs"/>
+              </a:defRPr>
+            </a:lvl3pPr>
+            <a:lvl4pPr marL="1263650" indent="-295275" algn="l" defTabSz="914400" rtl="0" eaLnBrk="1" latinLnBrk="0" hangingPunct="1">
+              <a:spcBef>
+                <a:spcPts val="600"/>
+              </a:spcBef>
+              <a:buClr>
+                <a:schemeClr val="accent1">
+                  <a:lumMod val="75000"/>
+                </a:schemeClr>
+              </a:buClr>
+              <a:buSzPct val="110000"/>
+              <a:buFont typeface="Wingdings 2" pitchFamily="18" charset="2"/>
+              <a:buChar char=""/>
+              <a:defRPr sz="1800" kern="1200">
+                <a:solidFill>
+                  <a:schemeClr val="tx1">
+                    <a:lumMod val="65000"/>
+                    <a:lumOff val="35000"/>
+                  </a:schemeClr>
+                </a:solidFill>
+                <a:latin typeface="+mn-lt"/>
+                <a:ea typeface="+mn-ea"/>
+                <a:cs typeface="+mn-cs"/>
+              </a:defRPr>
+            </a:lvl4pPr>
+            <a:lvl5pPr marL="1546225" indent="-282575" algn="l" defTabSz="914400" rtl="0" eaLnBrk="1" latinLnBrk="0" hangingPunct="1">
+              <a:spcBef>
+                <a:spcPts val="600"/>
+              </a:spcBef>
+              <a:buClr>
+                <a:schemeClr val="accent1">
+                  <a:lumMod val="60000"/>
+                  <a:lumOff val="40000"/>
+                </a:schemeClr>
+              </a:buClr>
+              <a:buSzPct val="110000"/>
+              <a:buFont typeface="Wingdings 2" pitchFamily="18" charset="2"/>
+              <a:buChar char=""/>
+              <a:defRPr sz="1800" kern="1200">
+                <a:solidFill>
+                  <a:schemeClr val="tx1">
+                    <a:lumMod val="65000"/>
+                    <a:lumOff val="35000"/>
+                  </a:schemeClr>
+                </a:solidFill>
+                <a:latin typeface="+mn-lt"/>
+                <a:ea typeface="+mn-ea"/>
+                <a:cs typeface="+mn-cs"/>
+              </a:defRPr>
+            </a:lvl5pPr>
+            <a:lvl6pPr marL="1828800" indent="-282575" algn="l" defTabSz="914400" rtl="0" eaLnBrk="1" latinLnBrk="0" hangingPunct="1">
+              <a:spcBef>
+                <a:spcPct val="20000"/>
+              </a:spcBef>
+              <a:buClr>
+                <a:schemeClr val="accent2"/>
+              </a:buClr>
+              <a:buSzPct val="110000"/>
+              <a:buFont typeface="Wingdings 2" pitchFamily="18" charset="2"/>
+              <a:buChar char=""/>
+              <a:defRPr lang="en-US" sz="1800" kern="1200" dirty="0" smtClean="0">
+                <a:solidFill>
+                  <a:schemeClr val="tx1">
+                    <a:lumMod val="65000"/>
+                    <a:lumOff val="35000"/>
+                  </a:schemeClr>
+                </a:solidFill>
+                <a:latin typeface="+mn-lt"/>
+                <a:ea typeface="+mn-ea"/>
+                <a:cs typeface="+mn-cs"/>
+              </a:defRPr>
+            </a:lvl6pPr>
+            <a:lvl7pPr marL="2117725" indent="-282575" algn="l" defTabSz="914400" rtl="0" eaLnBrk="1" latinLnBrk="0" hangingPunct="1">
+              <a:spcBef>
+                <a:spcPct val="20000"/>
+              </a:spcBef>
+              <a:buClr>
+                <a:schemeClr val="accent1">
+                  <a:lumMod val="60000"/>
+                  <a:lumOff val="40000"/>
+                </a:schemeClr>
+              </a:buClr>
+              <a:buSzPct val="110000"/>
+              <a:buFont typeface="Wingdings 2" pitchFamily="18" charset="2"/>
+              <a:buChar char=""/>
+              <a:defRPr lang="en-US" sz="1800" kern="1200" dirty="0" smtClean="0">
+                <a:solidFill>
+                  <a:schemeClr val="tx1">
+                    <a:lumMod val="65000"/>
+                    <a:lumOff val="35000"/>
+                  </a:schemeClr>
+                </a:solidFill>
+                <a:latin typeface="+mn-lt"/>
+                <a:ea typeface="+mn-ea"/>
+                <a:cs typeface="+mn-cs"/>
+              </a:defRPr>
+            </a:lvl7pPr>
+            <a:lvl8pPr marL="2398713" indent="-282575" algn="l" defTabSz="914400" rtl="0" eaLnBrk="1" latinLnBrk="0" hangingPunct="1">
+              <a:spcBef>
+                <a:spcPct val="20000"/>
+              </a:spcBef>
+              <a:buClr>
+                <a:schemeClr val="accent2"/>
+              </a:buClr>
+              <a:buSzPct val="110000"/>
+              <a:buFont typeface="Wingdings 2" pitchFamily="18" charset="2"/>
+              <a:buChar char=""/>
+              <a:defRPr lang="en-US" sz="1800" kern="1200" dirty="0" smtClean="0">
+                <a:solidFill>
+                  <a:schemeClr val="tx1">
+                    <a:lumMod val="65000"/>
+                    <a:lumOff val="35000"/>
+                  </a:schemeClr>
+                </a:solidFill>
+                <a:latin typeface="+mn-lt"/>
+                <a:ea typeface="+mn-ea"/>
+                <a:cs typeface="+mn-cs"/>
+              </a:defRPr>
+            </a:lvl8pPr>
+            <a:lvl9pPr marL="2689225" indent="-282575" algn="l" defTabSz="914400" rtl="0" eaLnBrk="1" latinLnBrk="0" hangingPunct="1">
+              <a:spcBef>
+                <a:spcPct val="20000"/>
+              </a:spcBef>
+              <a:buClr>
+                <a:schemeClr val="accent1">
+                  <a:lumMod val="60000"/>
+                  <a:lumOff val="40000"/>
+                </a:schemeClr>
+              </a:buClr>
+              <a:buSzPct val="110000"/>
+              <a:buFont typeface="Wingdings 2" pitchFamily="18" charset="2"/>
+              <a:buChar char=""/>
+              <a:defRPr lang="en-US" sz="1800" kern="1200" dirty="0">
+                <a:solidFill>
+                  <a:schemeClr val="tx1">
+                    <a:lumMod val="65000"/>
+                    <a:lumOff val="35000"/>
+                  </a:schemeClr>
+                </a:solidFill>
+                <a:latin typeface="+mn-lt"/>
+                <a:ea typeface="+mn-ea"/>
+                <a:cs typeface="+mn-cs"/>
+              </a:defRPr>
+            </a:lvl9pPr>
+          </a:lstStyle>
+          <a:p>
+            <a:r>
+              <a:rPr lang="en-US" sz="3000" dirty="0" smtClean="0">
+                <a:latin typeface="News Gothic MT"/>
+                <a:cs typeface="News Gothic MT"/>
+              </a:rPr>
+              <a:t>Differs from </a:t>
+            </a:r>
+            <a:r>
+              <a:rPr lang="en-US" sz="3000" dirty="0" err="1" smtClean="0">
+                <a:latin typeface="News Gothic MT"/>
+                <a:cs typeface="News Gothic MT"/>
+              </a:rPr>
+              <a:t>java.util.Collections</a:t>
+            </a:r>
+            <a:r>
+              <a:rPr lang="en-US" sz="3000" dirty="0" smtClean="0">
+                <a:latin typeface="News Gothic MT"/>
+                <a:cs typeface="News Gothic MT"/>
+              </a:rPr>
+              <a:t> </a:t>
+            </a:r>
+            <a:r>
+              <a:rPr lang="en-US" sz="3000" dirty="0" err="1" smtClean="0">
+                <a:latin typeface="News Gothic MT"/>
+                <a:cs typeface="News Gothic MT"/>
+              </a:rPr>
+              <a:t>unmodifiableXxx</a:t>
+            </a:r>
+            <a:r>
+              <a:rPr lang="en-US" sz="3000" dirty="0" smtClean="0">
+                <a:latin typeface="News Gothic MT"/>
+                <a:cs typeface="News Gothic MT"/>
+              </a:rPr>
+              <a:t>() methods</a:t>
+            </a:r>
+          </a:p>
+          <a:p>
+            <a:r>
+              <a:rPr lang="en-US" sz="3000" dirty="0" smtClean="0">
+                <a:latin typeface="News Gothic MT"/>
+                <a:cs typeface="News Gothic MT"/>
+              </a:rPr>
+              <a:t>Good for constants and defensive copies</a:t>
+            </a:r>
+            <a:endParaRPr lang="en-US" sz="2800" dirty="0">
+              <a:latin typeface="News Gothic MT"/>
+              <a:cs typeface="News Gothic MT"/>
+            </a:endParaRPr>
+          </a:p>
+          <a:p>
+            <a:r>
+              <a:rPr lang="en-US" sz="2800" dirty="0" smtClean="0">
+                <a:latin typeface="News Gothic MT"/>
+                <a:cs typeface="News Gothic MT"/>
+              </a:rPr>
+              <a:t>Offer builders for populating/configuring</a:t>
+            </a:r>
+            <a:endParaRPr lang="en-US" sz="3000" dirty="0" smtClean="0">
+              <a:latin typeface="News Gothic MT"/>
+              <a:cs typeface="News Gothic MT"/>
+            </a:endParaRPr>
+          </a:p>
+        </p:txBody>
+      </p:sp>
+    </p:spTree>
+    <p:extLst>
+      <p:ext uri="{BB962C8B-B14F-4D97-AF65-F5344CB8AC3E}">
+        <p14:creationId xmlns:p14="http://schemas.microsoft.com/office/powerpoint/2010/main" val="3111728448"/>
+      </p:ext>
+    </p:extLst>
+  </p:cSld>
+  <p:clrMapOvr>
+    <a:masterClrMapping/>
+  </p:clrMapOvr>
+  <p:timing>
+    <p:tnLst>
+      <p:par>
+        <p:cTn xmlns:p14="http://schemas.microsoft.com/office/powerpoint/2010/main" id="1" dur="indefinite" restart="never" nodeType="tmRoot"/>
+      </p:par>
+    </p:tnLst>
+  </p:timing>
+</p:sld>
+</file>
+
+<file path=ppt/slides/slide47.xml><?xml version="1.0" encoding="utf-8"?>
+<p:sld xmlns:a="http://schemas.openxmlformats.org/drawingml/2006/main" xmlns:r="http://schemas.openxmlformats.org/officeDocument/2006/relationships" xmlns:p="http://schemas.openxmlformats.org/presentationml/2006/main">
+  <p:cSld>
+    <p:spTree>
+      <p:nvGrpSpPr>
+        <p:cNvPr id="1" name=""/>
+        <p:cNvGrpSpPr/>
+        <p:nvPr/>
+      </p:nvGrpSpPr>
+      <p:grpSpPr>
+        <a:xfrm>
+          <a:off x="0" y="0"/>
+          <a:ext cx="0" cy="0"/>
+          <a:chOff x="0" y="0"/>
+          <a:chExt cx="0" cy="0"/>
+        </a:xfrm>
+      </p:grpSpPr>
+      <p:sp>
+        <p:nvSpPr>
+          <p:cNvPr id="2" name="Title 1"/>
+          <p:cNvSpPr>
+            <a:spLocks noGrp="1"/>
+          </p:cNvSpPr>
+          <p:nvPr>
+            <p:ph type="title"/>
+          </p:nvPr>
+        </p:nvSpPr>
+        <p:spPr>
+          <a:xfrm>
+            <a:off x="549275" y="245293"/>
+            <a:ext cx="8042276" cy="823757"/>
+          </a:xfrm>
+        </p:spPr>
+        <p:txBody>
+          <a:bodyPr/>
+          <a:lstStyle/>
+          <a:p>
+            <a:r>
+              <a:rPr lang="en-US" sz="4000" dirty="0" err="1" smtClean="0"/>
+              <a:t>ImmutableSortedSet</a:t>
+            </a:r>
+            <a:r>
+              <a:rPr lang="en-US" sz="4000" dirty="0" smtClean="0"/>
+              <a:t> example</a:t>
+            </a:r>
+            <a:endParaRPr lang="en-US" sz="4000" dirty="0"/>
+          </a:p>
+        </p:txBody>
+      </p:sp>
+      <p:sp>
+        <p:nvSpPr>
+          <p:cNvPr id="3" name="Content Placeholder 2"/>
+          <p:cNvSpPr>
+            <a:spLocks noGrp="1"/>
+          </p:cNvSpPr>
+          <p:nvPr>
+            <p:ph idx="1"/>
+          </p:nvPr>
+        </p:nvSpPr>
+        <p:spPr>
+          <a:xfrm>
+            <a:off x="440267" y="1450050"/>
+            <a:ext cx="8151284" cy="5196283"/>
+          </a:xfrm>
+        </p:spPr>
+        <p:txBody>
+          <a:bodyPr>
+            <a:noAutofit/>
+          </a:bodyPr>
+          <a:lstStyle/>
+          <a:p>
+            <a:pPr marL="0" indent="0">
+              <a:lnSpc>
+                <a:spcPts val="700"/>
+              </a:lnSpc>
+              <a:buNone/>
+            </a:pPr>
+            <a:endParaRPr lang="en-US" sz="2000" dirty="0">
+              <a:latin typeface="Monaco"/>
+              <a:cs typeface="Monaco"/>
+            </a:endParaRPr>
+          </a:p>
+          <a:p>
+            <a:pPr marL="0" indent="0">
+              <a:lnSpc>
+                <a:spcPts val="700"/>
+              </a:lnSpc>
+              <a:buNone/>
+            </a:pPr>
+            <a:r>
+              <a:rPr lang="en-US" sz="2000" dirty="0">
+                <a:latin typeface="Monaco"/>
+                <a:cs typeface="Monaco"/>
+              </a:rPr>
+              <a:t>@Test</a:t>
+            </a:r>
+          </a:p>
+          <a:p>
+            <a:pPr marL="0" indent="0">
+              <a:lnSpc>
+                <a:spcPts val="700"/>
+              </a:lnSpc>
+              <a:buNone/>
+            </a:pPr>
+            <a:r>
+              <a:rPr lang="en-US" sz="2000" dirty="0">
+                <a:latin typeface="Monaco"/>
+                <a:cs typeface="Monaco"/>
+              </a:rPr>
+              <a:t>public void </a:t>
+            </a:r>
+            <a:r>
+              <a:rPr lang="en-US" sz="2000" dirty="0" err="1">
+                <a:latin typeface="Monaco"/>
+                <a:cs typeface="Monaco"/>
+              </a:rPr>
+              <a:t>buildSetWithCoparator</a:t>
+            </a:r>
+            <a:r>
+              <a:rPr lang="en-US" sz="2000" dirty="0">
+                <a:latin typeface="Monaco"/>
+                <a:cs typeface="Monaco"/>
+              </a:rPr>
+              <a:t>() {</a:t>
+            </a:r>
+          </a:p>
+          <a:p>
+            <a:pPr marL="0" indent="0">
+              <a:lnSpc>
+                <a:spcPts val="700"/>
+              </a:lnSpc>
+              <a:buNone/>
+            </a:pPr>
+            <a:r>
+              <a:rPr lang="en-US" sz="2000" dirty="0">
+                <a:latin typeface="Monaco"/>
+                <a:cs typeface="Monaco"/>
+              </a:rPr>
+              <a:t>    </a:t>
+            </a:r>
+            <a:r>
+              <a:rPr lang="en-US" sz="2000" dirty="0" err="1">
+                <a:latin typeface="Monaco"/>
+                <a:cs typeface="Monaco"/>
+              </a:rPr>
+              <a:t>SortedSet</a:t>
+            </a:r>
+            <a:r>
+              <a:rPr lang="en-US" sz="2000" dirty="0">
+                <a:latin typeface="Monaco"/>
+                <a:cs typeface="Monaco"/>
+              </a:rPr>
+              <a:t>&lt;String&gt; set = </a:t>
+            </a:r>
+            <a:r>
+              <a:rPr lang="en-US" sz="2000" b="1" i="1" dirty="0" err="1">
+                <a:solidFill>
+                  <a:srgbClr val="586215"/>
+                </a:solidFill>
+                <a:latin typeface="Monaco"/>
+                <a:cs typeface="Monaco"/>
+              </a:rPr>
+              <a:t>ImmutableSortedSet</a:t>
+            </a:r>
+            <a:endParaRPr lang="en-US" sz="2000" b="1" i="1" dirty="0">
+              <a:solidFill>
+                <a:srgbClr val="586215"/>
+              </a:solidFill>
+              <a:latin typeface="Monaco"/>
+              <a:cs typeface="Monaco"/>
+            </a:endParaRPr>
+          </a:p>
+          <a:p>
+            <a:pPr marL="0" indent="0">
+              <a:lnSpc>
+                <a:spcPts val="700"/>
+              </a:lnSpc>
+              <a:buNone/>
+            </a:pPr>
+            <a:r>
+              <a:rPr lang="en-US" sz="2000" dirty="0">
+                <a:latin typeface="Monaco"/>
+                <a:cs typeface="Monaco"/>
+              </a:rPr>
+              <a:t>            .&lt;String&gt;</a:t>
+            </a:r>
+            <a:r>
+              <a:rPr lang="en-US" sz="2000" b="1" i="1" dirty="0" err="1">
+                <a:solidFill>
+                  <a:srgbClr val="586215"/>
+                </a:solidFill>
+                <a:latin typeface="Monaco"/>
+                <a:cs typeface="Monaco"/>
+              </a:rPr>
+              <a:t>reverseOrder</a:t>
+            </a:r>
+            <a:r>
+              <a:rPr lang="en-US" sz="2000" dirty="0">
+                <a:latin typeface="Monaco"/>
+                <a:cs typeface="Monaco"/>
+              </a:rPr>
+              <a:t>()</a:t>
+            </a:r>
+          </a:p>
+          <a:p>
+            <a:pPr marL="0" indent="0">
+              <a:lnSpc>
+                <a:spcPts val="700"/>
+              </a:lnSpc>
+              <a:buNone/>
+            </a:pPr>
+            <a:r>
+              <a:rPr lang="en-US" sz="2000" dirty="0">
+                <a:latin typeface="Monaco"/>
+                <a:cs typeface="Monaco"/>
+              </a:rPr>
+              <a:t>            .</a:t>
+            </a:r>
+            <a:r>
+              <a:rPr lang="en-US" sz="2000" b="1" i="1" dirty="0">
+                <a:solidFill>
+                  <a:srgbClr val="586215"/>
+                </a:solidFill>
+                <a:latin typeface="Monaco"/>
+                <a:cs typeface="Monaco"/>
+              </a:rPr>
+              <a:t>add</a:t>
+            </a:r>
+            <a:r>
+              <a:rPr lang="en-US" sz="2000" dirty="0">
+                <a:latin typeface="Monaco"/>
+                <a:cs typeface="Monaco"/>
+              </a:rPr>
+              <a:t>("foo", "bar", "</a:t>
+            </a:r>
+            <a:r>
+              <a:rPr lang="en-US" sz="2000" dirty="0" err="1">
+                <a:latin typeface="Monaco"/>
+                <a:cs typeface="Monaco"/>
+              </a:rPr>
+              <a:t>baz</a:t>
+            </a:r>
+            <a:r>
+              <a:rPr lang="en-US" sz="2000" dirty="0">
+                <a:latin typeface="Monaco"/>
+                <a:cs typeface="Monaco"/>
+              </a:rPr>
+              <a:t>")</a:t>
+            </a:r>
+          </a:p>
+          <a:p>
+            <a:pPr marL="0" indent="0">
+              <a:lnSpc>
+                <a:spcPts val="700"/>
+              </a:lnSpc>
+              <a:buNone/>
+            </a:pPr>
+            <a:r>
+              <a:rPr lang="en-US" sz="2000" dirty="0">
+                <a:latin typeface="Monaco"/>
+                <a:cs typeface="Monaco"/>
+              </a:rPr>
+              <a:t>            .</a:t>
+            </a:r>
+            <a:r>
+              <a:rPr lang="en-US" sz="2000" b="1" i="1" dirty="0">
+                <a:solidFill>
+                  <a:srgbClr val="586215"/>
+                </a:solidFill>
+                <a:latin typeface="Monaco"/>
+                <a:cs typeface="Monaco"/>
+              </a:rPr>
+              <a:t>build</a:t>
+            </a:r>
+            <a:r>
+              <a:rPr lang="en-US" sz="2000" dirty="0">
+                <a:latin typeface="Monaco"/>
+                <a:cs typeface="Monaco"/>
+              </a:rPr>
+              <a:t>();</a:t>
+            </a:r>
+          </a:p>
+          <a:p>
+            <a:pPr marL="0" indent="0">
+              <a:lnSpc>
+                <a:spcPts val="700"/>
+              </a:lnSpc>
+              <a:buNone/>
+            </a:pPr>
+            <a:endParaRPr lang="en-US" sz="2000" dirty="0">
+              <a:latin typeface="Monaco"/>
+              <a:cs typeface="Monaco"/>
+            </a:endParaRPr>
+          </a:p>
+          <a:p>
+            <a:pPr marL="0" indent="0">
+              <a:lnSpc>
+                <a:spcPts val="700"/>
+              </a:lnSpc>
+              <a:buNone/>
+            </a:pPr>
+            <a:r>
+              <a:rPr lang="en-US" sz="2000" dirty="0">
+                <a:latin typeface="Monaco"/>
+                <a:cs typeface="Monaco"/>
+              </a:rPr>
+              <a:t>    Iterator&lt;String&gt; </a:t>
+            </a:r>
+            <a:r>
+              <a:rPr lang="en-US" sz="2000" dirty="0" err="1">
+                <a:latin typeface="Monaco"/>
+                <a:cs typeface="Monaco"/>
+              </a:rPr>
+              <a:t>i</a:t>
+            </a:r>
+            <a:r>
+              <a:rPr lang="en-US" sz="2000" dirty="0">
+                <a:latin typeface="Monaco"/>
+                <a:cs typeface="Monaco"/>
+              </a:rPr>
+              <a:t> = </a:t>
+            </a:r>
+            <a:r>
+              <a:rPr lang="en-US" sz="2000" dirty="0" err="1">
+                <a:latin typeface="Monaco"/>
+                <a:cs typeface="Monaco"/>
+              </a:rPr>
+              <a:t>set.iterator</a:t>
+            </a:r>
+            <a:r>
+              <a:rPr lang="en-US" sz="2000" dirty="0">
+                <a:latin typeface="Monaco"/>
+                <a:cs typeface="Monaco"/>
+              </a:rPr>
+              <a:t>();</a:t>
+            </a:r>
+          </a:p>
+          <a:p>
+            <a:pPr marL="0" indent="0">
+              <a:lnSpc>
+                <a:spcPts val="700"/>
+              </a:lnSpc>
+              <a:buNone/>
+            </a:pPr>
+            <a:endParaRPr lang="en-US" sz="2000" dirty="0">
+              <a:latin typeface="Monaco"/>
+              <a:cs typeface="Monaco"/>
+            </a:endParaRPr>
+          </a:p>
+          <a:p>
+            <a:pPr marL="0" indent="0">
+              <a:lnSpc>
+                <a:spcPts val="700"/>
+              </a:lnSpc>
+              <a:buNone/>
+            </a:pPr>
+            <a:r>
+              <a:rPr lang="en-US" sz="2000" dirty="0">
+                <a:latin typeface="Monaco"/>
+                <a:cs typeface="Monaco"/>
+              </a:rPr>
+              <a:t>    </a:t>
+            </a:r>
+            <a:r>
+              <a:rPr lang="en-US" sz="2000" dirty="0" err="1">
+                <a:latin typeface="Monaco"/>
+                <a:cs typeface="Monaco"/>
+              </a:rPr>
+              <a:t>assertEquals</a:t>
+            </a:r>
+            <a:r>
+              <a:rPr lang="en-US" sz="2000" dirty="0">
+                <a:latin typeface="Monaco"/>
+                <a:cs typeface="Monaco"/>
+              </a:rPr>
+              <a:t>(3, </a:t>
+            </a:r>
+            <a:r>
+              <a:rPr lang="en-US" sz="2000" dirty="0" err="1">
+                <a:latin typeface="Monaco"/>
+                <a:cs typeface="Monaco"/>
+              </a:rPr>
+              <a:t>set.size</a:t>
+            </a:r>
+            <a:r>
+              <a:rPr lang="en-US" sz="2000" dirty="0">
+                <a:latin typeface="Monaco"/>
+                <a:cs typeface="Monaco"/>
+              </a:rPr>
+              <a:t>());</a:t>
+            </a:r>
+          </a:p>
+          <a:p>
+            <a:pPr marL="0" indent="0">
+              <a:lnSpc>
+                <a:spcPts val="700"/>
+              </a:lnSpc>
+              <a:buNone/>
+            </a:pPr>
+            <a:r>
+              <a:rPr lang="en-US" sz="2000" dirty="0">
+                <a:latin typeface="Monaco"/>
+                <a:cs typeface="Monaco"/>
+              </a:rPr>
+              <a:t>    </a:t>
+            </a:r>
+            <a:r>
+              <a:rPr lang="en-US" sz="2000" dirty="0" err="1">
+                <a:latin typeface="Monaco"/>
+                <a:cs typeface="Monaco"/>
+              </a:rPr>
+              <a:t>assertEquals</a:t>
+            </a:r>
+            <a:r>
+              <a:rPr lang="en-US" sz="2000" dirty="0">
+                <a:latin typeface="Monaco"/>
+                <a:cs typeface="Monaco"/>
+              </a:rPr>
+              <a:t>("foo", </a:t>
+            </a:r>
+            <a:r>
+              <a:rPr lang="en-US" sz="2000" dirty="0" err="1">
+                <a:latin typeface="Monaco"/>
+                <a:cs typeface="Monaco"/>
+              </a:rPr>
+              <a:t>i.next</a:t>
+            </a:r>
+            <a:r>
+              <a:rPr lang="en-US" sz="2000" dirty="0">
+                <a:latin typeface="Monaco"/>
+                <a:cs typeface="Monaco"/>
+              </a:rPr>
+              <a:t>());</a:t>
+            </a:r>
+          </a:p>
+          <a:p>
+            <a:pPr marL="0" indent="0">
+              <a:lnSpc>
+                <a:spcPts val="700"/>
+              </a:lnSpc>
+              <a:buNone/>
+            </a:pPr>
+            <a:r>
+              <a:rPr lang="en-US" sz="2000" dirty="0">
+                <a:latin typeface="Monaco"/>
+                <a:cs typeface="Monaco"/>
+              </a:rPr>
+              <a:t>    </a:t>
+            </a:r>
+            <a:r>
+              <a:rPr lang="en-US" sz="2000" dirty="0" err="1">
+                <a:latin typeface="Monaco"/>
+                <a:cs typeface="Monaco"/>
+              </a:rPr>
+              <a:t>assertEquals</a:t>
+            </a:r>
+            <a:r>
+              <a:rPr lang="en-US" sz="2000" dirty="0">
+                <a:latin typeface="Monaco"/>
+                <a:cs typeface="Monaco"/>
+              </a:rPr>
+              <a:t>("</a:t>
+            </a:r>
+            <a:r>
+              <a:rPr lang="en-US" sz="2000" dirty="0" err="1">
+                <a:latin typeface="Monaco"/>
+                <a:cs typeface="Monaco"/>
+              </a:rPr>
+              <a:t>baz</a:t>
+            </a:r>
+            <a:r>
+              <a:rPr lang="en-US" sz="2000" dirty="0">
+                <a:latin typeface="Monaco"/>
+                <a:cs typeface="Monaco"/>
+              </a:rPr>
+              <a:t>", </a:t>
+            </a:r>
+            <a:r>
+              <a:rPr lang="en-US" sz="2000" dirty="0" err="1">
+                <a:latin typeface="Monaco"/>
+                <a:cs typeface="Monaco"/>
+              </a:rPr>
+              <a:t>i.next</a:t>
+            </a:r>
+            <a:r>
+              <a:rPr lang="en-US" sz="2000" dirty="0">
+                <a:latin typeface="Monaco"/>
+                <a:cs typeface="Monaco"/>
+              </a:rPr>
+              <a:t>());</a:t>
+            </a:r>
+          </a:p>
+          <a:p>
+            <a:pPr marL="0" indent="0">
+              <a:lnSpc>
+                <a:spcPts val="700"/>
+              </a:lnSpc>
+              <a:buNone/>
+            </a:pPr>
+            <a:r>
+              <a:rPr lang="en-US" sz="2000" dirty="0">
+                <a:latin typeface="Monaco"/>
+                <a:cs typeface="Monaco"/>
+              </a:rPr>
+              <a:t>    </a:t>
+            </a:r>
+            <a:r>
+              <a:rPr lang="en-US" sz="2000" dirty="0" err="1">
+                <a:latin typeface="Monaco"/>
+                <a:cs typeface="Monaco"/>
+              </a:rPr>
+              <a:t>assertEquals</a:t>
+            </a:r>
+            <a:r>
+              <a:rPr lang="en-US" sz="2000" dirty="0">
+                <a:latin typeface="Monaco"/>
+                <a:cs typeface="Monaco"/>
+              </a:rPr>
+              <a:t>("bar", </a:t>
+            </a:r>
+            <a:r>
+              <a:rPr lang="en-US" sz="2000" dirty="0" err="1">
+                <a:latin typeface="Monaco"/>
+                <a:cs typeface="Monaco"/>
+              </a:rPr>
+              <a:t>i.next</a:t>
+            </a:r>
+            <a:r>
+              <a:rPr lang="en-US" sz="2000" dirty="0">
+                <a:latin typeface="Monaco"/>
+                <a:cs typeface="Monaco"/>
+              </a:rPr>
+              <a:t>());</a:t>
+            </a:r>
+          </a:p>
+          <a:p>
+            <a:pPr marL="0" indent="0">
+              <a:lnSpc>
+                <a:spcPts val="700"/>
+              </a:lnSpc>
+              <a:buNone/>
+            </a:pPr>
+            <a:r>
+              <a:rPr lang="en-US" sz="2000" dirty="0" smtClean="0">
+                <a:latin typeface="Monaco"/>
+                <a:cs typeface="Monaco"/>
+              </a:rPr>
+              <a:t>}</a:t>
+            </a:r>
+            <a:endParaRPr lang="en-US" sz="2000" dirty="0">
+              <a:latin typeface="Monaco"/>
+              <a:cs typeface="Monaco"/>
+            </a:endParaRPr>
+          </a:p>
+        </p:txBody>
+      </p:sp>
+    </p:spTree>
+    <p:extLst>
+      <p:ext uri="{BB962C8B-B14F-4D97-AF65-F5344CB8AC3E}">
+        <p14:creationId xmlns:p14="http://schemas.microsoft.com/office/powerpoint/2010/main" val="759201519"/>
+      </p:ext>
+    </p:extLst>
+  </p:cSld>
+  <p:clrMapOvr>
+    <a:masterClrMapping/>
+  </p:clrMapOvr>
+  <p:timing>
+    <p:tnLst>
+      <p:par>
+        <p:cTn xmlns:p14="http://schemas.microsoft.com/office/powerpoint/2010/main" id="1" dur="indefinite" restart="never" nodeType="tmRoot"/>
+      </p:par>
+    </p:tnLst>
+  </p:timing>
+</p:sld>
+</file>
+
+<file path=ppt/slides/slide48.xml><?xml version="1.0" encoding="utf-8"?>
+<p:sld xmlns:a="http://schemas.openxmlformats.org/drawingml/2006/main" xmlns:r="http://schemas.openxmlformats.org/officeDocument/2006/relationships" xmlns:p="http://schemas.openxmlformats.org/presentationml/2006/main">
+  <p:cSld>
+    <p:spTree>
+      <p:nvGrpSpPr>
+        <p:cNvPr id="1" name=""/>
+        <p:cNvGrpSpPr/>
+        <p:nvPr/>
+      </p:nvGrpSpPr>
+      <p:grpSpPr>
+        <a:xfrm>
+          <a:off x="0" y="0"/>
+          <a:ext cx="0" cy="0"/>
+          <a:chOff x="0" y="0"/>
+          <a:chExt cx="0" cy="0"/>
+        </a:xfrm>
+      </p:grpSpPr>
+      <p:sp>
+        <p:nvSpPr>
+          <p:cNvPr id="2" name="Title 1"/>
+          <p:cNvSpPr>
+            <a:spLocks noGrp="1"/>
+          </p:cNvSpPr>
+          <p:nvPr>
+            <p:ph type="title"/>
+          </p:nvPr>
+        </p:nvSpPr>
+        <p:spPr>
+          <a:xfrm>
+            <a:off x="549275" y="268443"/>
+            <a:ext cx="8042276" cy="823757"/>
+          </a:xfrm>
+        </p:spPr>
+        <p:txBody>
+          <a:bodyPr/>
+          <a:lstStyle/>
+          <a:p>
+            <a:r>
+              <a:rPr lang="en-US" sz="4000" dirty="0" err="1" smtClean="0"/>
+              <a:t>ImmutableMap</a:t>
+            </a:r>
+            <a:r>
+              <a:rPr lang="en-US" sz="4000" dirty="0" smtClean="0"/>
+              <a:t> example</a:t>
+            </a:r>
+            <a:endParaRPr lang="en-US" sz="4000" dirty="0"/>
+          </a:p>
+        </p:txBody>
+      </p:sp>
+      <p:sp>
+        <p:nvSpPr>
+          <p:cNvPr id="3" name="Content Placeholder 2"/>
+          <p:cNvSpPr>
+            <a:spLocks noGrp="1"/>
+          </p:cNvSpPr>
+          <p:nvPr>
+            <p:ph idx="1"/>
+          </p:nvPr>
+        </p:nvSpPr>
+        <p:spPr>
+          <a:xfrm>
+            <a:off x="440267" y="1483917"/>
+            <a:ext cx="8151284" cy="4942283"/>
+          </a:xfrm>
+        </p:spPr>
+        <p:txBody>
+          <a:bodyPr>
+            <a:noAutofit/>
+          </a:bodyPr>
+          <a:lstStyle/>
+          <a:p>
+            <a:pPr marL="0" indent="0">
+              <a:lnSpc>
+                <a:spcPts val="700"/>
+              </a:lnSpc>
+              <a:buNone/>
+            </a:pPr>
+            <a:endParaRPr lang="en-US" sz="2000" dirty="0">
+              <a:latin typeface="Monaco"/>
+              <a:cs typeface="Monaco"/>
+            </a:endParaRPr>
+          </a:p>
+          <a:p>
+            <a:pPr marL="0" indent="0">
+              <a:lnSpc>
+                <a:spcPts val="700"/>
+              </a:lnSpc>
+              <a:buNone/>
+            </a:pPr>
+            <a:r>
+              <a:rPr lang="en-US" sz="2000" dirty="0">
+                <a:latin typeface="Monaco"/>
+                <a:cs typeface="Monaco"/>
+              </a:rPr>
+              <a:t>@Test</a:t>
+            </a:r>
+          </a:p>
+          <a:p>
+            <a:pPr marL="0" indent="0">
+              <a:lnSpc>
+                <a:spcPts val="700"/>
+              </a:lnSpc>
+              <a:buNone/>
+            </a:pPr>
+            <a:r>
+              <a:rPr lang="en-US" sz="2000" dirty="0">
+                <a:latin typeface="Monaco"/>
+                <a:cs typeface="Monaco"/>
+              </a:rPr>
+              <a:t>public void </a:t>
+            </a:r>
+            <a:r>
+              <a:rPr lang="en-US" sz="2000" dirty="0" err="1">
+                <a:latin typeface="Monaco"/>
+                <a:cs typeface="Monaco"/>
+              </a:rPr>
+              <a:t>buildsMulitpleMaps</a:t>
+            </a:r>
+            <a:r>
+              <a:rPr lang="en-US" sz="2000" dirty="0">
+                <a:latin typeface="Monaco"/>
+                <a:cs typeface="Monaco"/>
+              </a:rPr>
+              <a:t>() {</a:t>
+            </a:r>
+          </a:p>
+          <a:p>
+            <a:pPr marL="0" indent="0">
+              <a:lnSpc>
+                <a:spcPts val="700"/>
+              </a:lnSpc>
+              <a:buNone/>
+            </a:pPr>
+            <a:r>
+              <a:rPr lang="en-US" sz="2000" dirty="0">
+                <a:latin typeface="Monaco"/>
+                <a:cs typeface="Monaco"/>
+              </a:rPr>
+              <a:t>    Builder&lt;String, Integer&gt; builder =</a:t>
+            </a:r>
+          </a:p>
+          <a:p>
+            <a:pPr marL="0" indent="0">
+              <a:lnSpc>
+                <a:spcPts val="700"/>
+              </a:lnSpc>
+              <a:buNone/>
+            </a:pPr>
+            <a:r>
+              <a:rPr lang="en-US" sz="2000" dirty="0">
+                <a:latin typeface="Monaco"/>
+                <a:cs typeface="Monaco"/>
+              </a:rPr>
+              <a:t>            </a:t>
+            </a:r>
+            <a:r>
+              <a:rPr lang="en-US" sz="2000" b="1" i="1" dirty="0" err="1">
+                <a:solidFill>
+                  <a:srgbClr val="586215"/>
+                </a:solidFill>
+                <a:latin typeface="Monaco"/>
+                <a:cs typeface="Monaco"/>
+              </a:rPr>
+              <a:t>ImmutableMap.builder</a:t>
+            </a:r>
+            <a:r>
+              <a:rPr lang="en-US" sz="2000" dirty="0">
+                <a:latin typeface="Monaco"/>
+                <a:cs typeface="Monaco"/>
+              </a:rPr>
+              <a:t>();</a:t>
+            </a:r>
+          </a:p>
+          <a:p>
+            <a:pPr marL="0" indent="0">
+              <a:lnSpc>
+                <a:spcPts val="700"/>
+              </a:lnSpc>
+              <a:buNone/>
+            </a:pPr>
+            <a:endParaRPr lang="en-US" sz="2000" dirty="0">
+              <a:latin typeface="Monaco"/>
+              <a:cs typeface="Monaco"/>
+            </a:endParaRPr>
+          </a:p>
+          <a:p>
+            <a:pPr marL="0" indent="0">
+              <a:lnSpc>
+                <a:spcPts val="700"/>
+              </a:lnSpc>
+              <a:buNone/>
+            </a:pPr>
+            <a:r>
+              <a:rPr lang="en-US" sz="2000" dirty="0">
+                <a:latin typeface="Monaco"/>
+                <a:cs typeface="Monaco"/>
+              </a:rPr>
+              <a:t>    </a:t>
+            </a:r>
+            <a:r>
+              <a:rPr lang="en-US" sz="2000" dirty="0" err="1">
+                <a:latin typeface="Monaco"/>
+                <a:cs typeface="Monaco"/>
+              </a:rPr>
+              <a:t>builder.</a:t>
+            </a:r>
+            <a:r>
+              <a:rPr lang="en-US" sz="2000" b="1" i="1" dirty="0" err="1">
+                <a:solidFill>
+                  <a:srgbClr val="586215"/>
+                </a:solidFill>
+                <a:latin typeface="Monaco"/>
+                <a:cs typeface="Monaco"/>
+              </a:rPr>
+              <a:t>put</a:t>
+            </a:r>
+            <a:r>
+              <a:rPr lang="en-US" sz="2000" dirty="0">
+                <a:latin typeface="Monaco"/>
+                <a:cs typeface="Monaco"/>
+              </a:rPr>
+              <a:t>("one", 1);</a:t>
+            </a:r>
+          </a:p>
+          <a:p>
+            <a:pPr marL="0" indent="0">
+              <a:lnSpc>
+                <a:spcPts val="700"/>
+              </a:lnSpc>
+              <a:buNone/>
+            </a:pPr>
+            <a:r>
+              <a:rPr lang="en-US" sz="2000" dirty="0">
+                <a:latin typeface="Monaco"/>
+                <a:cs typeface="Monaco"/>
+              </a:rPr>
+              <a:t>    Map&lt;String, Integer&gt; first = </a:t>
+            </a:r>
+            <a:r>
+              <a:rPr lang="en-US" sz="2000" b="1" i="1" dirty="0" err="1">
+                <a:solidFill>
+                  <a:srgbClr val="586215"/>
+                </a:solidFill>
+                <a:latin typeface="Monaco"/>
+                <a:cs typeface="Monaco"/>
+              </a:rPr>
+              <a:t>builder.build</a:t>
+            </a:r>
+            <a:r>
+              <a:rPr lang="en-US" sz="2000" dirty="0">
+                <a:latin typeface="Monaco"/>
+                <a:cs typeface="Monaco"/>
+              </a:rPr>
+              <a:t>();</a:t>
+            </a:r>
+          </a:p>
+          <a:p>
+            <a:pPr marL="0" indent="0">
+              <a:lnSpc>
+                <a:spcPts val="700"/>
+              </a:lnSpc>
+              <a:buNone/>
+            </a:pPr>
+            <a:r>
+              <a:rPr lang="en-US" sz="2000" dirty="0">
+                <a:latin typeface="Monaco"/>
+                <a:cs typeface="Monaco"/>
+              </a:rPr>
+              <a:t>    </a:t>
+            </a:r>
+            <a:r>
+              <a:rPr lang="en-US" sz="2000" dirty="0" err="1">
+                <a:latin typeface="Monaco"/>
+                <a:cs typeface="Monaco"/>
+              </a:rPr>
+              <a:t>builder.</a:t>
+            </a:r>
+            <a:r>
+              <a:rPr lang="en-US" sz="2000" b="1" i="1" dirty="0" err="1">
+                <a:solidFill>
+                  <a:srgbClr val="586215"/>
+                </a:solidFill>
+                <a:latin typeface="Monaco"/>
+                <a:cs typeface="Monaco"/>
+              </a:rPr>
+              <a:t>put</a:t>
+            </a:r>
+            <a:r>
+              <a:rPr lang="en-US" sz="2000" dirty="0">
+                <a:latin typeface="Monaco"/>
+                <a:cs typeface="Monaco"/>
+              </a:rPr>
+              <a:t>("two", 2);</a:t>
+            </a:r>
+          </a:p>
+          <a:p>
+            <a:pPr marL="0" indent="0">
+              <a:lnSpc>
+                <a:spcPts val="700"/>
+              </a:lnSpc>
+              <a:buNone/>
+            </a:pPr>
+            <a:r>
+              <a:rPr lang="en-US" sz="2000" dirty="0">
+                <a:latin typeface="Monaco"/>
+                <a:cs typeface="Monaco"/>
+              </a:rPr>
+              <a:t>    Map&lt;String, Integer&gt; second = </a:t>
+            </a:r>
+            <a:r>
+              <a:rPr lang="en-US" sz="2000" b="1" i="1" dirty="0" err="1">
+                <a:solidFill>
+                  <a:srgbClr val="586215"/>
+                </a:solidFill>
+                <a:latin typeface="Monaco"/>
+                <a:cs typeface="Monaco"/>
+              </a:rPr>
+              <a:t>builder.build</a:t>
+            </a:r>
+            <a:r>
+              <a:rPr lang="en-US" sz="2000" dirty="0">
+                <a:latin typeface="Monaco"/>
+                <a:cs typeface="Monaco"/>
+              </a:rPr>
+              <a:t>();</a:t>
+            </a:r>
+          </a:p>
+          <a:p>
+            <a:pPr marL="0" indent="0">
+              <a:lnSpc>
+                <a:spcPts val="700"/>
+              </a:lnSpc>
+              <a:buNone/>
+            </a:pPr>
+            <a:endParaRPr lang="en-US" sz="2000" dirty="0">
+              <a:latin typeface="Monaco"/>
+              <a:cs typeface="Monaco"/>
+            </a:endParaRPr>
+          </a:p>
+          <a:p>
+            <a:pPr marL="0" indent="0">
+              <a:lnSpc>
+                <a:spcPts val="700"/>
+              </a:lnSpc>
+              <a:buNone/>
+            </a:pPr>
+            <a:r>
+              <a:rPr lang="en-US" sz="2000" dirty="0">
+                <a:latin typeface="Monaco"/>
+                <a:cs typeface="Monaco"/>
+              </a:rPr>
+              <a:t>    </a:t>
+            </a:r>
+            <a:r>
+              <a:rPr lang="en-US" sz="2000" dirty="0" err="1">
+                <a:latin typeface="Monaco"/>
+                <a:cs typeface="Monaco"/>
+              </a:rPr>
+              <a:t>assertEquals</a:t>
+            </a:r>
+            <a:r>
+              <a:rPr lang="en-US" sz="2000" dirty="0">
+                <a:latin typeface="Monaco"/>
+                <a:cs typeface="Monaco"/>
+              </a:rPr>
+              <a:t>(1, </a:t>
+            </a:r>
+            <a:r>
+              <a:rPr lang="en-US" sz="2000" dirty="0" err="1">
+                <a:latin typeface="Monaco"/>
+                <a:cs typeface="Monaco"/>
+              </a:rPr>
+              <a:t>first.size</a:t>
+            </a:r>
+            <a:r>
+              <a:rPr lang="en-US" sz="2000" dirty="0">
+                <a:latin typeface="Monaco"/>
+                <a:cs typeface="Monaco"/>
+              </a:rPr>
+              <a:t>());</a:t>
+            </a:r>
+          </a:p>
+          <a:p>
+            <a:pPr marL="0" indent="0">
+              <a:lnSpc>
+                <a:spcPts val="700"/>
+              </a:lnSpc>
+              <a:buNone/>
+            </a:pPr>
+            <a:r>
+              <a:rPr lang="en-US" sz="2000" dirty="0">
+                <a:latin typeface="Monaco"/>
+                <a:cs typeface="Monaco"/>
+              </a:rPr>
+              <a:t>    </a:t>
+            </a:r>
+            <a:r>
+              <a:rPr lang="en-US" sz="2000" dirty="0" err="1">
+                <a:latin typeface="Monaco"/>
+                <a:cs typeface="Monaco"/>
+              </a:rPr>
+              <a:t>assertEquals</a:t>
+            </a:r>
+            <a:r>
+              <a:rPr lang="en-US" sz="2000" dirty="0">
+                <a:latin typeface="Monaco"/>
+                <a:cs typeface="Monaco"/>
+              </a:rPr>
+              <a:t>(2, </a:t>
+            </a:r>
+            <a:r>
+              <a:rPr lang="en-US" sz="2000" dirty="0" err="1">
+                <a:latin typeface="Monaco"/>
+                <a:cs typeface="Monaco"/>
+              </a:rPr>
+              <a:t>second.size</a:t>
+            </a:r>
+            <a:r>
+              <a:rPr lang="en-US" sz="2000" dirty="0">
+                <a:latin typeface="Monaco"/>
+                <a:cs typeface="Monaco"/>
+              </a:rPr>
+              <a:t>());</a:t>
+            </a:r>
+          </a:p>
+          <a:p>
+            <a:pPr marL="0" indent="0">
+              <a:lnSpc>
+                <a:spcPts val="700"/>
+              </a:lnSpc>
+              <a:buNone/>
+            </a:pPr>
+            <a:r>
+              <a:rPr lang="en-US" sz="2000" dirty="0" smtClean="0">
+                <a:latin typeface="Monaco"/>
+                <a:cs typeface="Monaco"/>
+              </a:rPr>
+              <a:t>}</a:t>
+            </a:r>
+            <a:endParaRPr lang="en-US" sz="2000" dirty="0">
+              <a:latin typeface="Monaco"/>
+              <a:cs typeface="Monaco"/>
+            </a:endParaRPr>
+          </a:p>
+        </p:txBody>
+      </p:sp>
+    </p:spTree>
+    <p:extLst>
+      <p:ext uri="{BB962C8B-B14F-4D97-AF65-F5344CB8AC3E}">
+        <p14:creationId xmlns:p14="http://schemas.microsoft.com/office/powerpoint/2010/main" val="234493767"/>
+      </p:ext>
+    </p:extLst>
+  </p:cSld>
+  <p:clrMapOvr>
+    <a:masterClrMapping/>
+  </p:clrMapOvr>
+  <p:timing>
+    <p:tnLst>
+      <p:par>
+        <p:cTn xmlns:p14="http://schemas.microsoft.com/office/powerpoint/2010/main" id="1" dur="indefinite" restart="never" nodeType="tmRoot"/>
+      </p:par>
+    </p:tnLst>
+  </p:timing>
+</p:sld>
+</file>
+
+<file path=ppt/slides/slide49.xml><?xml version="1.0" encoding="utf-8"?>
+<p:sld xmlns:a="http://schemas.openxmlformats.org/drawingml/2006/main" xmlns:r="http://schemas.openxmlformats.org/officeDocument/2006/relationships" xmlns:p="http://schemas.openxmlformats.org/presentationml/2006/main">
+  <p:cSld>
+    <p:spTree>
+      <p:nvGrpSpPr>
+        <p:cNvPr id="1" name=""/>
+        <p:cNvGrpSpPr/>
+        <p:nvPr/>
+      </p:nvGrpSpPr>
+      <p:grpSpPr>
+        <a:xfrm>
+          <a:off x="0" y="0"/>
+          <a:ext cx="0" cy="0"/>
+          <a:chOff x="0" y="0"/>
+          <a:chExt cx="0" cy="0"/>
+        </a:xfrm>
+      </p:grpSpPr>
+      <p:sp>
+        <p:nvSpPr>
+          <p:cNvPr id="2" name="Title 1"/>
+          <p:cNvSpPr>
+            <a:spLocks noGrp="1"/>
+          </p:cNvSpPr>
+          <p:nvPr>
+            <p:ph type="title"/>
+          </p:nvPr>
+        </p:nvSpPr>
+        <p:spPr>
+          <a:xfrm>
+            <a:off x="549275" y="556310"/>
+            <a:ext cx="8042276" cy="823757"/>
+          </a:xfrm>
+        </p:spPr>
+        <p:txBody>
+          <a:bodyPr/>
+          <a:lstStyle/>
+          <a:p>
+            <a:r>
+              <a:rPr lang="en-US" sz="4000" dirty="0" smtClean="0"/>
+              <a:t>Defensive copy example</a:t>
+            </a:r>
+            <a:endParaRPr lang="en-US" sz="4000" dirty="0"/>
+          </a:p>
+        </p:txBody>
+      </p:sp>
+      <p:sp>
+        <p:nvSpPr>
+          <p:cNvPr id="3" name="Content Placeholder 2"/>
+          <p:cNvSpPr>
+            <a:spLocks noGrp="1"/>
+          </p:cNvSpPr>
+          <p:nvPr>
+            <p:ph idx="1"/>
+          </p:nvPr>
+        </p:nvSpPr>
+        <p:spPr>
+          <a:xfrm>
+            <a:off x="440267" y="2082800"/>
+            <a:ext cx="8151284" cy="4343400"/>
+          </a:xfrm>
+        </p:spPr>
+        <p:txBody>
+          <a:bodyPr>
+            <a:noAutofit/>
+          </a:bodyPr>
+          <a:lstStyle/>
+          <a:p>
+            <a:pPr marL="0" indent="0">
+              <a:lnSpc>
+                <a:spcPts val="700"/>
+              </a:lnSpc>
+              <a:buNone/>
+            </a:pPr>
+            <a:endParaRPr lang="en-US" sz="2000" dirty="0">
+              <a:latin typeface="Monaco"/>
+              <a:cs typeface="Monaco"/>
+            </a:endParaRPr>
+          </a:p>
+          <a:p>
+            <a:pPr marL="0" indent="0">
+              <a:lnSpc>
+                <a:spcPts val="700"/>
+              </a:lnSpc>
+              <a:buNone/>
+            </a:pPr>
+            <a:r>
+              <a:rPr lang="en-US" sz="2000" dirty="0">
+                <a:latin typeface="Monaco"/>
+                <a:cs typeface="Monaco"/>
+              </a:rPr>
+              <a:t>public class House {</a:t>
+            </a:r>
+          </a:p>
+          <a:p>
+            <a:pPr marL="0" indent="0">
+              <a:lnSpc>
+                <a:spcPts val="700"/>
+              </a:lnSpc>
+              <a:buNone/>
+            </a:pPr>
+            <a:endParaRPr lang="en-US" sz="2000" dirty="0">
+              <a:latin typeface="Monaco"/>
+              <a:cs typeface="Monaco"/>
+            </a:endParaRPr>
+          </a:p>
+          <a:p>
+            <a:pPr marL="0" indent="0">
+              <a:lnSpc>
+                <a:spcPts val="700"/>
+              </a:lnSpc>
+              <a:buNone/>
+            </a:pPr>
+            <a:r>
+              <a:rPr lang="en-US" sz="2000" dirty="0">
+                <a:latin typeface="Monaco"/>
+                <a:cs typeface="Monaco"/>
+              </a:rPr>
+              <a:t>    private final List&lt;Room&gt; rooms;</a:t>
+            </a:r>
+          </a:p>
+          <a:p>
+            <a:pPr marL="0" indent="0">
+              <a:lnSpc>
+                <a:spcPts val="700"/>
+              </a:lnSpc>
+              <a:buNone/>
+            </a:pPr>
+            <a:endParaRPr lang="en-US" sz="2000" dirty="0">
+              <a:latin typeface="Monaco"/>
+              <a:cs typeface="Monaco"/>
+            </a:endParaRPr>
+          </a:p>
+          <a:p>
+            <a:pPr marL="0" indent="0">
+              <a:lnSpc>
+                <a:spcPts val="700"/>
+              </a:lnSpc>
+              <a:buNone/>
+            </a:pPr>
+            <a:r>
+              <a:rPr lang="en-US" sz="2000" dirty="0">
+                <a:latin typeface="Monaco"/>
+                <a:cs typeface="Monaco"/>
+              </a:rPr>
+              <a:t>    public House(List&lt;Room&gt; rooms) {</a:t>
+            </a:r>
+          </a:p>
+          <a:p>
+            <a:pPr marL="0" indent="0">
+              <a:lnSpc>
+                <a:spcPts val="700"/>
+              </a:lnSpc>
+              <a:buNone/>
+            </a:pPr>
+            <a:r>
+              <a:rPr lang="en-US" sz="2000" dirty="0">
+                <a:latin typeface="Monaco"/>
+                <a:cs typeface="Monaco"/>
+              </a:rPr>
+              <a:t>        </a:t>
+            </a:r>
+            <a:r>
+              <a:rPr lang="en-US" sz="2000" dirty="0" err="1">
+                <a:latin typeface="Monaco"/>
+                <a:cs typeface="Monaco"/>
+              </a:rPr>
+              <a:t>this.rooms</a:t>
+            </a:r>
+            <a:r>
+              <a:rPr lang="en-US" sz="2000" dirty="0">
+                <a:latin typeface="Monaco"/>
+                <a:cs typeface="Monaco"/>
+              </a:rPr>
+              <a:t> = </a:t>
+            </a:r>
+            <a:r>
+              <a:rPr lang="en-US" sz="2000" b="1" i="1" dirty="0" err="1">
+                <a:solidFill>
+                  <a:srgbClr val="586215"/>
+                </a:solidFill>
+                <a:latin typeface="Monaco"/>
+                <a:cs typeface="Monaco"/>
+              </a:rPr>
+              <a:t>ImmutableList.copyOf</a:t>
+            </a:r>
+            <a:r>
+              <a:rPr lang="en-US" sz="2000" dirty="0">
+                <a:latin typeface="Monaco"/>
+                <a:cs typeface="Monaco"/>
+              </a:rPr>
+              <a:t>(rooms);</a:t>
+            </a:r>
+          </a:p>
+          <a:p>
+            <a:pPr marL="0" indent="0">
+              <a:lnSpc>
+                <a:spcPts val="700"/>
+              </a:lnSpc>
+              <a:buNone/>
+            </a:pPr>
+            <a:r>
+              <a:rPr lang="en-US" sz="2000" dirty="0">
+                <a:latin typeface="Monaco"/>
+                <a:cs typeface="Monaco"/>
+              </a:rPr>
+              <a:t>    }</a:t>
+            </a:r>
+          </a:p>
+          <a:p>
+            <a:pPr marL="0" indent="0">
+              <a:lnSpc>
+                <a:spcPts val="700"/>
+              </a:lnSpc>
+              <a:buNone/>
+            </a:pPr>
+            <a:r>
+              <a:rPr lang="en-US" sz="2000" dirty="0" smtClean="0">
+                <a:latin typeface="Monaco"/>
+                <a:cs typeface="Monaco"/>
+              </a:rPr>
+              <a:t>}</a:t>
+            </a:r>
+            <a:endParaRPr lang="en-US" sz="2000" dirty="0">
+              <a:latin typeface="Monaco"/>
+              <a:cs typeface="Monaco"/>
+            </a:endParaRPr>
+          </a:p>
+        </p:txBody>
+      </p:sp>
+    </p:spTree>
+    <p:extLst>
+      <p:ext uri="{BB962C8B-B14F-4D97-AF65-F5344CB8AC3E}">
+        <p14:creationId xmlns:p14="http://schemas.microsoft.com/office/powerpoint/2010/main" val="898940979"/>
       </p:ext>
     </p:extLst>
   </p:cSld>

</xml_diff>

<commit_message>
Getting ready for TCS demo.
</commit_message>
<xml_diff>
--- a/JavaMUG - Guava.pptx
+++ b/JavaMUG - Guava.pptx
@@ -5,7 +5,7 @@
     <p:sldMasterId id="2147483660" r:id="rId1"/>
   </p:sldMasterIdLst>
   <p:notesMasterIdLst>
-    <p:notesMasterId r:id="rId51"/>
+    <p:notesMasterId r:id="rId54"/>
   </p:notesMasterIdLst>
   <p:sldIdLst>
     <p:sldId id="256" r:id="rId2"/>
@@ -57,6 +57,9 @@
     <p:sldId id="312" r:id="rId48"/>
     <p:sldId id="313" r:id="rId49"/>
     <p:sldId id="314" r:id="rId50"/>
+    <p:sldId id="315" r:id="rId51"/>
+    <p:sldId id="317" r:id="rId52"/>
+    <p:sldId id="316" r:id="rId53"/>
   </p:sldIdLst>
   <p:sldSz cx="9144000" cy="6858000" type="screen4x3"/>
   <p:notesSz cx="6858000" cy="9144000"/>
@@ -240,7 +243,7 @@
           <a:p>
             <a:fld id="{8D7C17D1-822C-D245-8E59-CC30A49789B4}" type="datetimeFigureOut">
               <a:rPr lang="en-US" smtClean="0"/>
-              <a:t>9/6/11</a:t>
+              <a:t>9/7/11</a:t>
             </a:fld>
             <a:endParaRPr lang="en-US"/>
           </a:p>
@@ -875,7 +878,7 @@
           <a:p>
             <a:fld id="{B01F9CA3-105E-4857-9057-6DB6197DA786}" type="datetimeFigureOut">
               <a:rPr lang="en-US" smtClean="0"/>
-              <a:t>9/6/11</a:t>
+              <a:t>9/7/11</a:t>
             </a:fld>
             <a:endParaRPr lang="en-US"/>
           </a:p>
@@ -1067,7 +1070,7 @@
           <a:p>
             <a:fld id="{B01F9CA3-105E-4857-9057-6DB6197DA786}" type="datetimeFigureOut">
               <a:rPr lang="en-US" smtClean="0"/>
-              <a:t>9/6/11</a:t>
+              <a:t>9/7/11</a:t>
             </a:fld>
             <a:endParaRPr lang="en-US"/>
           </a:p>
@@ -1364,7 +1367,7 @@
           <a:p>
             <a:fld id="{B01F9CA3-105E-4857-9057-6DB6197DA786}" type="datetimeFigureOut">
               <a:rPr lang="en-US" smtClean="0"/>
-              <a:t>9/6/11</a:t>
+              <a:t>9/7/11</a:t>
             </a:fld>
             <a:endParaRPr lang="en-US"/>
           </a:p>
@@ -1571,7 +1574,7 @@
           <a:p>
             <a:fld id="{B01F9CA3-105E-4857-9057-6DB6197DA786}" type="datetimeFigureOut">
               <a:rPr lang="en-US" smtClean="0"/>
-              <a:t>9/6/11</a:t>
+              <a:t>9/7/11</a:t>
             </a:fld>
             <a:endParaRPr lang="en-US"/>
           </a:p>
@@ -1768,7 +1771,7 @@
           <a:p>
             <a:fld id="{B01F9CA3-105E-4857-9057-6DB6197DA786}" type="datetimeFigureOut">
               <a:rPr lang="en-US" smtClean="0"/>
-              <a:t>9/6/11</a:t>
+              <a:t>9/7/11</a:t>
             </a:fld>
             <a:endParaRPr lang="en-US"/>
           </a:p>
@@ -2010,7 +2013,7 @@
           <a:p>
             <a:fld id="{B01F9CA3-105E-4857-9057-6DB6197DA786}" type="datetimeFigureOut">
               <a:rPr lang="en-US" smtClean="0"/>
-              <a:t>9/6/11</a:t>
+              <a:t>9/7/11</a:t>
             </a:fld>
             <a:endParaRPr lang="en-US"/>
           </a:p>
@@ -2333,7 +2336,7 @@
           <a:p>
             <a:fld id="{B01F9CA3-105E-4857-9057-6DB6197DA786}" type="datetimeFigureOut">
               <a:rPr lang="en-US" smtClean="0"/>
-              <a:t>9/6/11</a:t>
+              <a:t>9/7/11</a:t>
             </a:fld>
             <a:endParaRPr lang="en-US"/>
           </a:p>
@@ -2687,7 +2690,7 @@
           <a:p>
             <a:fld id="{B01F9CA3-105E-4857-9057-6DB6197DA786}" type="datetimeFigureOut">
               <a:rPr lang="en-US" smtClean="0"/>
-              <a:t>9/6/11</a:t>
+              <a:t>9/7/11</a:t>
             </a:fld>
             <a:endParaRPr lang="en-US"/>
           </a:p>
@@ -3199,7 +3202,7 @@
           <a:p>
             <a:fld id="{B01F9CA3-105E-4857-9057-6DB6197DA786}" type="datetimeFigureOut">
               <a:rPr lang="en-US" smtClean="0"/>
-              <a:t>9/6/11</a:t>
+              <a:t>9/7/11</a:t>
             </a:fld>
             <a:endParaRPr lang="en-US"/>
           </a:p>
@@ -3312,7 +3315,7 @@
           <a:p>
             <a:fld id="{B01F9CA3-105E-4857-9057-6DB6197DA786}" type="datetimeFigureOut">
               <a:rPr lang="en-US" smtClean="0"/>
-              <a:t>9/6/11</a:t>
+              <a:t>9/7/11</a:t>
             </a:fld>
             <a:endParaRPr lang="en-US"/>
           </a:p>
@@ -3402,7 +3405,7 @@
           <a:p>
             <a:fld id="{B01F9CA3-105E-4857-9057-6DB6197DA786}" type="datetimeFigureOut">
               <a:rPr lang="en-US" smtClean="0"/>
-              <a:t>9/6/11</a:t>
+              <a:t>9/7/11</a:t>
             </a:fld>
             <a:endParaRPr lang="en-US"/>
           </a:p>
@@ -3712,7 +3715,7 @@
           <a:p>
             <a:fld id="{B01F9CA3-105E-4857-9057-6DB6197DA786}" type="datetimeFigureOut">
               <a:rPr lang="en-US" smtClean="0"/>
-              <a:t>9/6/11</a:t>
+              <a:t>9/7/11</a:t>
             </a:fld>
             <a:endParaRPr lang="en-US"/>
           </a:p>
@@ -3946,7 +3949,7 @@
           <a:p>
             <a:fld id="{B01F9CA3-105E-4857-9057-6DB6197DA786}" type="datetimeFigureOut">
               <a:rPr lang="en-US" smtClean="0"/>
-              <a:t>9/6/11</a:t>
+              <a:t>9/7/11</a:t>
             </a:fld>
             <a:endParaRPr lang="en-US"/>
           </a:p>
@@ -18047,7 +18050,7 @@
         </p:nvSpPr>
         <p:spPr>
           <a:xfrm>
-            <a:off x="440267" y="2082800"/>
+            <a:off x="440267" y="1642533"/>
             <a:ext cx="8151284" cy="4343400"/>
           </a:xfrm>
         </p:spPr>
@@ -18288,6 +18291,1430 @@
     <p:extLst>
       <p:ext uri="{BB962C8B-B14F-4D97-AF65-F5344CB8AC3E}">
         <p14:creationId xmlns:p14="http://schemas.microsoft.com/office/powerpoint/2010/main" val="836909618"/>
+      </p:ext>
+    </p:extLst>
+  </p:cSld>
+  <p:clrMapOvr>
+    <a:masterClrMapping/>
+  </p:clrMapOvr>
+  <p:timing>
+    <p:tnLst>
+      <p:par>
+        <p:cTn xmlns:p14="http://schemas.microsoft.com/office/powerpoint/2010/main" id="1" dur="indefinite" restart="never" nodeType="tmRoot"/>
+      </p:par>
+    </p:tnLst>
+  </p:timing>
+</p:sld>
+</file>
+
+<file path=ppt/slides/slide50.xml><?xml version="1.0" encoding="utf-8"?>
+<p:sld xmlns:a="http://schemas.openxmlformats.org/drawingml/2006/main" xmlns:r="http://schemas.openxmlformats.org/officeDocument/2006/relationships" xmlns:p="http://schemas.openxmlformats.org/presentationml/2006/main">
+  <p:cSld>
+    <p:spTree>
+      <p:nvGrpSpPr>
+        <p:cNvPr id="1" name=""/>
+        <p:cNvGrpSpPr/>
+        <p:nvPr/>
+      </p:nvGrpSpPr>
+      <p:grpSpPr>
+        <a:xfrm>
+          <a:off x="0" y="0"/>
+          <a:ext cx="0" cy="0"/>
+          <a:chOff x="0" y="0"/>
+          <a:chExt cx="0" cy="0"/>
+        </a:xfrm>
+      </p:grpSpPr>
+      <p:sp>
+        <p:nvSpPr>
+          <p:cNvPr id="2" name="Title 1"/>
+          <p:cNvSpPr>
+            <a:spLocks noGrp="1"/>
+          </p:cNvSpPr>
+          <p:nvPr>
+            <p:ph type="title"/>
+          </p:nvPr>
+        </p:nvSpPr>
+        <p:spPr>
+          <a:xfrm>
+            <a:off x="549275" y="107577"/>
+            <a:ext cx="8042276" cy="908424"/>
+          </a:xfrm>
+        </p:spPr>
+        <p:txBody>
+          <a:bodyPr/>
+          <a:lstStyle/>
+          <a:p>
+            <a:r>
+              <a:rPr lang="en-US" sz="4400" dirty="0" smtClean="0"/>
+              <a:t>Collections helpers</a:t>
+            </a:r>
+            <a:endParaRPr lang="en-US" sz="4400" dirty="0"/>
+          </a:p>
+        </p:txBody>
+      </p:sp>
+      <p:sp>
+        <p:nvSpPr>
+          <p:cNvPr id="3" name="Content Placeholder 2"/>
+          <p:cNvSpPr>
+            <a:spLocks noGrp="1"/>
+          </p:cNvSpPr>
+          <p:nvPr>
+            <p:ph idx="1"/>
+          </p:nvPr>
+        </p:nvSpPr>
+        <p:spPr>
+          <a:xfrm>
+            <a:off x="549275" y="1138767"/>
+            <a:ext cx="8042276" cy="1282700"/>
+          </a:xfrm>
+        </p:spPr>
+        <p:txBody>
+          <a:bodyPr numCol="1">
+            <a:normAutofit/>
+          </a:bodyPr>
+          <a:lstStyle/>
+          <a:p>
+            <a:r>
+              <a:rPr lang="en-US" sz="3000" dirty="0" smtClean="0">
+                <a:latin typeface="News Gothic MT"/>
+                <a:cs typeface="News Gothic MT"/>
+              </a:rPr>
+              <a:t>A set of classes with static methods for working with Java’s collection classes:</a:t>
+            </a:r>
+            <a:endParaRPr lang="en-US" sz="3000" dirty="0" smtClean="0">
+              <a:latin typeface="News Gothic MT"/>
+              <a:cs typeface="News Gothic MT"/>
+            </a:endParaRPr>
+          </a:p>
+        </p:txBody>
+      </p:sp>
+      <p:sp>
+        <p:nvSpPr>
+          <p:cNvPr id="4" name="Content Placeholder 2"/>
+          <p:cNvSpPr txBox="1">
+            <a:spLocks/>
+          </p:cNvSpPr>
+          <p:nvPr/>
+        </p:nvSpPr>
+        <p:spPr>
+          <a:xfrm>
+            <a:off x="549275" y="2116931"/>
+            <a:ext cx="8042276" cy="1354404"/>
+          </a:xfrm>
+          <a:prstGeom prst="rect">
+            <a:avLst/>
+          </a:prstGeom>
+        </p:spPr>
+        <p:txBody>
+          <a:bodyPr vert="horz" lIns="91440" tIns="45720" rIns="91440" bIns="45720" numCol="2" rtlCol="0">
+            <a:normAutofit fontScale="92500" lnSpcReduction="10000"/>
+          </a:bodyPr>
+          <a:lstStyle>
+            <a:lvl1pPr marL="349250" indent="-349250" algn="l" defTabSz="914400" rtl="0" eaLnBrk="1" latinLnBrk="0" hangingPunct="1">
+              <a:spcBef>
+                <a:spcPts val="2000"/>
+              </a:spcBef>
+              <a:buClr>
+                <a:schemeClr val="accent1">
+                  <a:lumMod val="60000"/>
+                  <a:lumOff val="40000"/>
+                </a:schemeClr>
+              </a:buClr>
+              <a:buSzPct val="110000"/>
+              <a:buFont typeface="Wingdings 2" pitchFamily="18" charset="2"/>
+              <a:buChar char=""/>
+              <a:defRPr sz="2400" kern="1200">
+                <a:solidFill>
+                  <a:schemeClr val="tx1">
+                    <a:lumMod val="65000"/>
+                    <a:lumOff val="35000"/>
+                  </a:schemeClr>
+                </a:solidFill>
+                <a:latin typeface="+mn-lt"/>
+                <a:ea typeface="+mn-ea"/>
+                <a:cs typeface="+mn-cs"/>
+              </a:defRPr>
+            </a:lvl1pPr>
+            <a:lvl2pPr marL="685800" indent="-336550" algn="l" defTabSz="914400" rtl="0" eaLnBrk="1" latinLnBrk="0" hangingPunct="1">
+              <a:spcBef>
+                <a:spcPts val="600"/>
+              </a:spcBef>
+              <a:buClr>
+                <a:schemeClr val="accent1">
+                  <a:lumMod val="75000"/>
+                </a:schemeClr>
+              </a:buClr>
+              <a:buSzPct val="110000"/>
+              <a:buFont typeface="Wingdings 2" pitchFamily="18" charset="2"/>
+              <a:buChar char=""/>
+              <a:defRPr sz="2200" kern="1200">
+                <a:solidFill>
+                  <a:schemeClr val="tx1">
+                    <a:lumMod val="65000"/>
+                    <a:lumOff val="35000"/>
+                  </a:schemeClr>
+                </a:solidFill>
+                <a:latin typeface="+mn-lt"/>
+                <a:ea typeface="+mn-ea"/>
+                <a:cs typeface="+mn-cs"/>
+              </a:defRPr>
+            </a:lvl2pPr>
+            <a:lvl3pPr marL="968375" indent="-282575" algn="l" defTabSz="914400" rtl="0" eaLnBrk="1" latinLnBrk="0" hangingPunct="1">
+              <a:spcBef>
+                <a:spcPts val="600"/>
+              </a:spcBef>
+              <a:buClr>
+                <a:schemeClr val="accent1">
+                  <a:lumMod val="60000"/>
+                  <a:lumOff val="40000"/>
+                </a:schemeClr>
+              </a:buClr>
+              <a:buSzPct val="110000"/>
+              <a:buFont typeface="Wingdings 2" pitchFamily="18" charset="2"/>
+              <a:buChar char=""/>
+              <a:defRPr sz="2000" kern="1200">
+                <a:solidFill>
+                  <a:schemeClr val="tx1">
+                    <a:lumMod val="65000"/>
+                    <a:lumOff val="35000"/>
+                  </a:schemeClr>
+                </a:solidFill>
+                <a:latin typeface="+mn-lt"/>
+                <a:ea typeface="+mn-ea"/>
+                <a:cs typeface="+mn-cs"/>
+              </a:defRPr>
+            </a:lvl3pPr>
+            <a:lvl4pPr marL="1263650" indent="-295275" algn="l" defTabSz="914400" rtl="0" eaLnBrk="1" latinLnBrk="0" hangingPunct="1">
+              <a:spcBef>
+                <a:spcPts val="600"/>
+              </a:spcBef>
+              <a:buClr>
+                <a:schemeClr val="accent1">
+                  <a:lumMod val="75000"/>
+                </a:schemeClr>
+              </a:buClr>
+              <a:buSzPct val="110000"/>
+              <a:buFont typeface="Wingdings 2" pitchFamily="18" charset="2"/>
+              <a:buChar char=""/>
+              <a:defRPr sz="1800" kern="1200">
+                <a:solidFill>
+                  <a:schemeClr val="tx1">
+                    <a:lumMod val="65000"/>
+                    <a:lumOff val="35000"/>
+                  </a:schemeClr>
+                </a:solidFill>
+                <a:latin typeface="+mn-lt"/>
+                <a:ea typeface="+mn-ea"/>
+                <a:cs typeface="+mn-cs"/>
+              </a:defRPr>
+            </a:lvl4pPr>
+            <a:lvl5pPr marL="1546225" indent="-282575" algn="l" defTabSz="914400" rtl="0" eaLnBrk="1" latinLnBrk="0" hangingPunct="1">
+              <a:spcBef>
+                <a:spcPts val="600"/>
+              </a:spcBef>
+              <a:buClr>
+                <a:schemeClr val="accent1">
+                  <a:lumMod val="60000"/>
+                  <a:lumOff val="40000"/>
+                </a:schemeClr>
+              </a:buClr>
+              <a:buSzPct val="110000"/>
+              <a:buFont typeface="Wingdings 2" pitchFamily="18" charset="2"/>
+              <a:buChar char=""/>
+              <a:defRPr sz="1800" kern="1200">
+                <a:solidFill>
+                  <a:schemeClr val="tx1">
+                    <a:lumMod val="65000"/>
+                    <a:lumOff val="35000"/>
+                  </a:schemeClr>
+                </a:solidFill>
+                <a:latin typeface="+mn-lt"/>
+                <a:ea typeface="+mn-ea"/>
+                <a:cs typeface="+mn-cs"/>
+              </a:defRPr>
+            </a:lvl5pPr>
+            <a:lvl6pPr marL="1828800" indent="-282575" algn="l" defTabSz="914400" rtl="0" eaLnBrk="1" latinLnBrk="0" hangingPunct="1">
+              <a:spcBef>
+                <a:spcPct val="20000"/>
+              </a:spcBef>
+              <a:buClr>
+                <a:schemeClr val="accent2"/>
+              </a:buClr>
+              <a:buSzPct val="110000"/>
+              <a:buFont typeface="Wingdings 2" pitchFamily="18" charset="2"/>
+              <a:buChar char=""/>
+              <a:defRPr lang="en-US" sz="1800" kern="1200" dirty="0" smtClean="0">
+                <a:solidFill>
+                  <a:schemeClr val="tx1">
+                    <a:lumMod val="65000"/>
+                    <a:lumOff val="35000"/>
+                  </a:schemeClr>
+                </a:solidFill>
+                <a:latin typeface="+mn-lt"/>
+                <a:ea typeface="+mn-ea"/>
+                <a:cs typeface="+mn-cs"/>
+              </a:defRPr>
+            </a:lvl6pPr>
+            <a:lvl7pPr marL="2117725" indent="-282575" algn="l" defTabSz="914400" rtl="0" eaLnBrk="1" latinLnBrk="0" hangingPunct="1">
+              <a:spcBef>
+                <a:spcPct val="20000"/>
+              </a:spcBef>
+              <a:buClr>
+                <a:schemeClr val="accent1">
+                  <a:lumMod val="60000"/>
+                  <a:lumOff val="40000"/>
+                </a:schemeClr>
+              </a:buClr>
+              <a:buSzPct val="110000"/>
+              <a:buFont typeface="Wingdings 2" pitchFamily="18" charset="2"/>
+              <a:buChar char=""/>
+              <a:defRPr lang="en-US" sz="1800" kern="1200" dirty="0" smtClean="0">
+                <a:solidFill>
+                  <a:schemeClr val="tx1">
+                    <a:lumMod val="65000"/>
+                    <a:lumOff val="35000"/>
+                  </a:schemeClr>
+                </a:solidFill>
+                <a:latin typeface="+mn-lt"/>
+                <a:ea typeface="+mn-ea"/>
+                <a:cs typeface="+mn-cs"/>
+              </a:defRPr>
+            </a:lvl7pPr>
+            <a:lvl8pPr marL="2398713" indent="-282575" algn="l" defTabSz="914400" rtl="0" eaLnBrk="1" latinLnBrk="0" hangingPunct="1">
+              <a:spcBef>
+                <a:spcPct val="20000"/>
+              </a:spcBef>
+              <a:buClr>
+                <a:schemeClr val="accent2"/>
+              </a:buClr>
+              <a:buSzPct val="110000"/>
+              <a:buFont typeface="Wingdings 2" pitchFamily="18" charset="2"/>
+              <a:buChar char=""/>
+              <a:defRPr lang="en-US" sz="1800" kern="1200" dirty="0" smtClean="0">
+                <a:solidFill>
+                  <a:schemeClr val="tx1">
+                    <a:lumMod val="65000"/>
+                    <a:lumOff val="35000"/>
+                  </a:schemeClr>
+                </a:solidFill>
+                <a:latin typeface="+mn-lt"/>
+                <a:ea typeface="+mn-ea"/>
+                <a:cs typeface="+mn-cs"/>
+              </a:defRPr>
+            </a:lvl8pPr>
+            <a:lvl9pPr marL="2689225" indent="-282575" algn="l" defTabSz="914400" rtl="0" eaLnBrk="1" latinLnBrk="0" hangingPunct="1">
+              <a:spcBef>
+                <a:spcPct val="20000"/>
+              </a:spcBef>
+              <a:buClr>
+                <a:schemeClr val="accent1">
+                  <a:lumMod val="60000"/>
+                  <a:lumOff val="40000"/>
+                </a:schemeClr>
+              </a:buClr>
+              <a:buSzPct val="110000"/>
+              <a:buFont typeface="Wingdings 2" pitchFamily="18" charset="2"/>
+              <a:buChar char=""/>
+              <a:defRPr lang="en-US" sz="1800" kern="1200" dirty="0">
+                <a:solidFill>
+                  <a:schemeClr val="tx1">
+                    <a:lumMod val="65000"/>
+                    <a:lumOff val="35000"/>
+                  </a:schemeClr>
+                </a:solidFill>
+                <a:latin typeface="+mn-lt"/>
+                <a:ea typeface="+mn-ea"/>
+                <a:cs typeface="+mn-cs"/>
+              </a:defRPr>
+            </a:lvl9pPr>
+          </a:lstStyle>
+          <a:p>
+            <a:pPr lvl="1"/>
+            <a:r>
+              <a:rPr lang="en-US" sz="2800" dirty="0" err="1" smtClean="0">
+                <a:latin typeface="News Gothic MT"/>
+                <a:cs typeface="News Gothic MT"/>
+              </a:rPr>
+              <a:t>Iterables</a:t>
+            </a:r>
+            <a:endParaRPr lang="en-US" sz="2800" dirty="0" smtClean="0">
+              <a:latin typeface="News Gothic MT"/>
+              <a:cs typeface="News Gothic MT"/>
+            </a:endParaRPr>
+          </a:p>
+          <a:p>
+            <a:pPr lvl="1"/>
+            <a:r>
+              <a:rPr lang="en-US" sz="2800" dirty="0" smtClean="0">
+                <a:latin typeface="News Gothic MT"/>
+                <a:cs typeface="News Gothic MT"/>
+              </a:rPr>
+              <a:t>Iterators</a:t>
+            </a:r>
+            <a:endParaRPr lang="en-US" sz="2800" dirty="0" smtClean="0">
+              <a:latin typeface="News Gothic MT"/>
+              <a:cs typeface="News Gothic MT"/>
+            </a:endParaRPr>
+          </a:p>
+          <a:p>
+            <a:pPr lvl="1"/>
+            <a:r>
+              <a:rPr lang="en-US" sz="2800" dirty="0" smtClean="0">
+                <a:latin typeface="News Gothic MT"/>
+                <a:cs typeface="News Gothic MT"/>
+              </a:rPr>
+              <a:t>Lists</a:t>
+            </a:r>
+            <a:endParaRPr lang="en-US" sz="2800" dirty="0" smtClean="0">
+              <a:latin typeface="News Gothic MT"/>
+              <a:cs typeface="News Gothic MT"/>
+            </a:endParaRPr>
+          </a:p>
+          <a:p>
+            <a:pPr lvl="1"/>
+            <a:r>
+              <a:rPr lang="en-US" sz="2800" dirty="0" smtClean="0">
+                <a:latin typeface="News Gothic MT"/>
+                <a:cs typeface="News Gothic MT"/>
+              </a:rPr>
+              <a:t>Maps</a:t>
+            </a:r>
+          </a:p>
+          <a:p>
+            <a:pPr lvl="1"/>
+            <a:r>
+              <a:rPr lang="en-US" sz="2800" dirty="0" smtClean="0">
+                <a:latin typeface="News Gothic MT"/>
+                <a:cs typeface="News Gothic MT"/>
+              </a:rPr>
+              <a:t>Sets</a:t>
+            </a:r>
+            <a:endParaRPr lang="en-US" sz="2800" dirty="0" smtClean="0">
+              <a:latin typeface="News Gothic MT"/>
+              <a:cs typeface="News Gothic MT"/>
+            </a:endParaRPr>
+          </a:p>
+          <a:p>
+            <a:pPr lvl="1"/>
+            <a:endParaRPr lang="en-US" sz="2800" dirty="0" smtClean="0">
+              <a:latin typeface="News Gothic MT"/>
+              <a:cs typeface="News Gothic MT"/>
+            </a:endParaRPr>
+          </a:p>
+          <a:p>
+            <a:pPr lvl="1"/>
+            <a:endParaRPr lang="en-US" sz="2800" dirty="0" smtClean="0">
+              <a:latin typeface="News Gothic MT"/>
+              <a:cs typeface="News Gothic MT"/>
+            </a:endParaRPr>
+          </a:p>
+          <a:p>
+            <a:pPr lvl="1"/>
+            <a:endParaRPr lang="en-US" sz="2800" dirty="0" smtClean="0">
+              <a:latin typeface="News Gothic MT"/>
+              <a:cs typeface="News Gothic MT"/>
+            </a:endParaRPr>
+          </a:p>
+          <a:p>
+            <a:pPr lvl="1"/>
+            <a:endParaRPr lang="en-US" sz="2800" dirty="0" smtClean="0">
+              <a:latin typeface="News Gothic MT"/>
+              <a:cs typeface="News Gothic MT"/>
+            </a:endParaRPr>
+          </a:p>
+          <a:p>
+            <a:pPr lvl="1"/>
+            <a:endParaRPr lang="en-US" sz="2800" dirty="0" smtClean="0">
+              <a:latin typeface="News Gothic MT"/>
+              <a:cs typeface="News Gothic MT"/>
+            </a:endParaRPr>
+          </a:p>
+        </p:txBody>
+      </p:sp>
+      <p:sp>
+        <p:nvSpPr>
+          <p:cNvPr id="6" name="Content Placeholder 2"/>
+          <p:cNvSpPr txBox="1">
+            <a:spLocks/>
+          </p:cNvSpPr>
+          <p:nvPr/>
+        </p:nvSpPr>
+        <p:spPr>
+          <a:xfrm>
+            <a:off x="549275" y="3547534"/>
+            <a:ext cx="8042276" cy="3031066"/>
+          </a:xfrm>
+          <a:prstGeom prst="rect">
+            <a:avLst/>
+          </a:prstGeom>
+        </p:spPr>
+        <p:txBody>
+          <a:bodyPr vert="horz" lIns="91440" tIns="45720" rIns="91440" bIns="45720" numCol="1" rtlCol="0">
+            <a:normAutofit fontScale="92500" lnSpcReduction="10000"/>
+          </a:bodyPr>
+          <a:lstStyle>
+            <a:lvl1pPr marL="349250" indent="-349250" algn="l" defTabSz="914400" rtl="0" eaLnBrk="1" latinLnBrk="0" hangingPunct="1">
+              <a:spcBef>
+                <a:spcPts val="2000"/>
+              </a:spcBef>
+              <a:buClr>
+                <a:schemeClr val="accent1">
+                  <a:lumMod val="60000"/>
+                  <a:lumOff val="40000"/>
+                </a:schemeClr>
+              </a:buClr>
+              <a:buSzPct val="110000"/>
+              <a:buFont typeface="Wingdings 2" pitchFamily="18" charset="2"/>
+              <a:buChar char=""/>
+              <a:defRPr sz="2400" kern="1200">
+                <a:solidFill>
+                  <a:schemeClr val="tx1">
+                    <a:lumMod val="65000"/>
+                    <a:lumOff val="35000"/>
+                  </a:schemeClr>
+                </a:solidFill>
+                <a:latin typeface="+mn-lt"/>
+                <a:ea typeface="+mn-ea"/>
+                <a:cs typeface="+mn-cs"/>
+              </a:defRPr>
+            </a:lvl1pPr>
+            <a:lvl2pPr marL="685800" indent="-336550" algn="l" defTabSz="914400" rtl="0" eaLnBrk="1" latinLnBrk="0" hangingPunct="1">
+              <a:spcBef>
+                <a:spcPts val="600"/>
+              </a:spcBef>
+              <a:buClr>
+                <a:schemeClr val="accent1">
+                  <a:lumMod val="75000"/>
+                </a:schemeClr>
+              </a:buClr>
+              <a:buSzPct val="110000"/>
+              <a:buFont typeface="Wingdings 2" pitchFamily="18" charset="2"/>
+              <a:buChar char=""/>
+              <a:defRPr sz="2200" kern="1200">
+                <a:solidFill>
+                  <a:schemeClr val="tx1">
+                    <a:lumMod val="65000"/>
+                    <a:lumOff val="35000"/>
+                  </a:schemeClr>
+                </a:solidFill>
+                <a:latin typeface="+mn-lt"/>
+                <a:ea typeface="+mn-ea"/>
+                <a:cs typeface="+mn-cs"/>
+              </a:defRPr>
+            </a:lvl2pPr>
+            <a:lvl3pPr marL="968375" indent="-282575" algn="l" defTabSz="914400" rtl="0" eaLnBrk="1" latinLnBrk="0" hangingPunct="1">
+              <a:spcBef>
+                <a:spcPts val="600"/>
+              </a:spcBef>
+              <a:buClr>
+                <a:schemeClr val="accent1">
+                  <a:lumMod val="60000"/>
+                  <a:lumOff val="40000"/>
+                </a:schemeClr>
+              </a:buClr>
+              <a:buSzPct val="110000"/>
+              <a:buFont typeface="Wingdings 2" pitchFamily="18" charset="2"/>
+              <a:buChar char=""/>
+              <a:defRPr sz="2000" kern="1200">
+                <a:solidFill>
+                  <a:schemeClr val="tx1">
+                    <a:lumMod val="65000"/>
+                    <a:lumOff val="35000"/>
+                  </a:schemeClr>
+                </a:solidFill>
+                <a:latin typeface="+mn-lt"/>
+                <a:ea typeface="+mn-ea"/>
+                <a:cs typeface="+mn-cs"/>
+              </a:defRPr>
+            </a:lvl3pPr>
+            <a:lvl4pPr marL="1263650" indent="-295275" algn="l" defTabSz="914400" rtl="0" eaLnBrk="1" latinLnBrk="0" hangingPunct="1">
+              <a:spcBef>
+                <a:spcPts val="600"/>
+              </a:spcBef>
+              <a:buClr>
+                <a:schemeClr val="accent1">
+                  <a:lumMod val="75000"/>
+                </a:schemeClr>
+              </a:buClr>
+              <a:buSzPct val="110000"/>
+              <a:buFont typeface="Wingdings 2" pitchFamily="18" charset="2"/>
+              <a:buChar char=""/>
+              <a:defRPr sz="1800" kern="1200">
+                <a:solidFill>
+                  <a:schemeClr val="tx1">
+                    <a:lumMod val="65000"/>
+                    <a:lumOff val="35000"/>
+                  </a:schemeClr>
+                </a:solidFill>
+                <a:latin typeface="+mn-lt"/>
+                <a:ea typeface="+mn-ea"/>
+                <a:cs typeface="+mn-cs"/>
+              </a:defRPr>
+            </a:lvl4pPr>
+            <a:lvl5pPr marL="1546225" indent="-282575" algn="l" defTabSz="914400" rtl="0" eaLnBrk="1" latinLnBrk="0" hangingPunct="1">
+              <a:spcBef>
+                <a:spcPts val="600"/>
+              </a:spcBef>
+              <a:buClr>
+                <a:schemeClr val="accent1">
+                  <a:lumMod val="60000"/>
+                  <a:lumOff val="40000"/>
+                </a:schemeClr>
+              </a:buClr>
+              <a:buSzPct val="110000"/>
+              <a:buFont typeface="Wingdings 2" pitchFamily="18" charset="2"/>
+              <a:buChar char=""/>
+              <a:defRPr sz="1800" kern="1200">
+                <a:solidFill>
+                  <a:schemeClr val="tx1">
+                    <a:lumMod val="65000"/>
+                    <a:lumOff val="35000"/>
+                  </a:schemeClr>
+                </a:solidFill>
+                <a:latin typeface="+mn-lt"/>
+                <a:ea typeface="+mn-ea"/>
+                <a:cs typeface="+mn-cs"/>
+              </a:defRPr>
+            </a:lvl5pPr>
+            <a:lvl6pPr marL="1828800" indent="-282575" algn="l" defTabSz="914400" rtl="0" eaLnBrk="1" latinLnBrk="0" hangingPunct="1">
+              <a:spcBef>
+                <a:spcPct val="20000"/>
+              </a:spcBef>
+              <a:buClr>
+                <a:schemeClr val="accent2"/>
+              </a:buClr>
+              <a:buSzPct val="110000"/>
+              <a:buFont typeface="Wingdings 2" pitchFamily="18" charset="2"/>
+              <a:buChar char=""/>
+              <a:defRPr lang="en-US" sz="1800" kern="1200" dirty="0" smtClean="0">
+                <a:solidFill>
+                  <a:schemeClr val="tx1">
+                    <a:lumMod val="65000"/>
+                    <a:lumOff val="35000"/>
+                  </a:schemeClr>
+                </a:solidFill>
+                <a:latin typeface="+mn-lt"/>
+                <a:ea typeface="+mn-ea"/>
+                <a:cs typeface="+mn-cs"/>
+              </a:defRPr>
+            </a:lvl6pPr>
+            <a:lvl7pPr marL="2117725" indent="-282575" algn="l" defTabSz="914400" rtl="0" eaLnBrk="1" latinLnBrk="0" hangingPunct="1">
+              <a:spcBef>
+                <a:spcPct val="20000"/>
+              </a:spcBef>
+              <a:buClr>
+                <a:schemeClr val="accent1">
+                  <a:lumMod val="60000"/>
+                  <a:lumOff val="40000"/>
+                </a:schemeClr>
+              </a:buClr>
+              <a:buSzPct val="110000"/>
+              <a:buFont typeface="Wingdings 2" pitchFamily="18" charset="2"/>
+              <a:buChar char=""/>
+              <a:defRPr lang="en-US" sz="1800" kern="1200" dirty="0" smtClean="0">
+                <a:solidFill>
+                  <a:schemeClr val="tx1">
+                    <a:lumMod val="65000"/>
+                    <a:lumOff val="35000"/>
+                  </a:schemeClr>
+                </a:solidFill>
+                <a:latin typeface="+mn-lt"/>
+                <a:ea typeface="+mn-ea"/>
+                <a:cs typeface="+mn-cs"/>
+              </a:defRPr>
+            </a:lvl7pPr>
+            <a:lvl8pPr marL="2398713" indent="-282575" algn="l" defTabSz="914400" rtl="0" eaLnBrk="1" latinLnBrk="0" hangingPunct="1">
+              <a:spcBef>
+                <a:spcPct val="20000"/>
+              </a:spcBef>
+              <a:buClr>
+                <a:schemeClr val="accent2"/>
+              </a:buClr>
+              <a:buSzPct val="110000"/>
+              <a:buFont typeface="Wingdings 2" pitchFamily="18" charset="2"/>
+              <a:buChar char=""/>
+              <a:defRPr lang="en-US" sz="1800" kern="1200" dirty="0" smtClean="0">
+                <a:solidFill>
+                  <a:schemeClr val="tx1">
+                    <a:lumMod val="65000"/>
+                    <a:lumOff val="35000"/>
+                  </a:schemeClr>
+                </a:solidFill>
+                <a:latin typeface="+mn-lt"/>
+                <a:ea typeface="+mn-ea"/>
+                <a:cs typeface="+mn-cs"/>
+              </a:defRPr>
+            </a:lvl8pPr>
+            <a:lvl9pPr marL="2689225" indent="-282575" algn="l" defTabSz="914400" rtl="0" eaLnBrk="1" latinLnBrk="0" hangingPunct="1">
+              <a:spcBef>
+                <a:spcPct val="20000"/>
+              </a:spcBef>
+              <a:buClr>
+                <a:schemeClr val="accent1">
+                  <a:lumMod val="60000"/>
+                  <a:lumOff val="40000"/>
+                </a:schemeClr>
+              </a:buClr>
+              <a:buSzPct val="110000"/>
+              <a:buFont typeface="Wingdings 2" pitchFamily="18" charset="2"/>
+              <a:buChar char=""/>
+              <a:defRPr lang="en-US" sz="1800" kern="1200" dirty="0">
+                <a:solidFill>
+                  <a:schemeClr val="tx1">
+                    <a:lumMod val="65000"/>
+                    <a:lumOff val="35000"/>
+                  </a:schemeClr>
+                </a:solidFill>
+                <a:latin typeface="+mn-lt"/>
+                <a:ea typeface="+mn-ea"/>
+                <a:cs typeface="+mn-cs"/>
+              </a:defRPr>
+            </a:lvl9pPr>
+          </a:lstStyle>
+          <a:p>
+            <a:r>
+              <a:rPr lang="en-US" sz="3000" dirty="0" smtClean="0">
+                <a:latin typeface="News Gothic MT"/>
+                <a:cs typeface="News Gothic MT"/>
+              </a:rPr>
+              <a:t>Methods for:</a:t>
+            </a:r>
+          </a:p>
+          <a:p>
+            <a:pPr lvl="1"/>
+            <a:r>
+              <a:rPr lang="en-US" sz="2800" dirty="0" smtClean="0">
+                <a:latin typeface="News Gothic MT"/>
+                <a:cs typeface="News Gothic MT"/>
+              </a:rPr>
+              <a:t>Creating new instances</a:t>
+            </a:r>
+          </a:p>
+          <a:p>
+            <a:pPr lvl="1"/>
+            <a:r>
+              <a:rPr lang="en-US" sz="2800" dirty="0" smtClean="0">
+                <a:latin typeface="News Gothic MT"/>
+                <a:cs typeface="News Gothic MT"/>
+              </a:rPr>
+              <a:t>Checking if Predicate matches any/all</a:t>
+            </a:r>
+          </a:p>
+          <a:p>
+            <a:pPr lvl="1"/>
+            <a:r>
+              <a:rPr lang="en-US" sz="2800" dirty="0" smtClean="0">
+                <a:latin typeface="News Gothic MT"/>
+                <a:cs typeface="News Gothic MT"/>
+              </a:rPr>
+              <a:t>Filtering collections with Predicates</a:t>
+            </a:r>
+          </a:p>
+          <a:p>
+            <a:pPr lvl="1"/>
+            <a:r>
+              <a:rPr lang="en-US" sz="2800" dirty="0">
+                <a:cs typeface="News Gothic MT"/>
+              </a:rPr>
+              <a:t>Transforming collections with Functions</a:t>
+            </a:r>
+          </a:p>
+          <a:p>
+            <a:pPr lvl="1"/>
+            <a:r>
+              <a:rPr lang="en-US" sz="2800" dirty="0" smtClean="0">
+                <a:latin typeface="News Gothic MT"/>
+                <a:cs typeface="News Gothic MT"/>
+              </a:rPr>
+              <a:t>Creating views of differences, unions</a:t>
+            </a:r>
+            <a:r>
+              <a:rPr lang="en-US" sz="2800" dirty="0">
+                <a:latin typeface="News Gothic MT"/>
+                <a:cs typeface="News Gothic MT"/>
+              </a:rPr>
+              <a:t> </a:t>
+            </a:r>
+            <a:r>
+              <a:rPr lang="en-US" sz="2800" dirty="0" smtClean="0">
+                <a:latin typeface="News Gothic MT"/>
+                <a:cs typeface="News Gothic MT"/>
+              </a:rPr>
+              <a:t>and intersections</a:t>
+            </a:r>
+          </a:p>
+        </p:txBody>
+      </p:sp>
+    </p:spTree>
+    <p:extLst>
+      <p:ext uri="{BB962C8B-B14F-4D97-AF65-F5344CB8AC3E}">
+        <p14:creationId xmlns:p14="http://schemas.microsoft.com/office/powerpoint/2010/main" val="996901724"/>
+      </p:ext>
+    </p:extLst>
+  </p:cSld>
+  <p:clrMapOvr>
+    <a:masterClrMapping/>
+  </p:clrMapOvr>
+  <p:timing>
+    <p:tnLst>
+      <p:par>
+        <p:cTn xmlns:p14="http://schemas.microsoft.com/office/powerpoint/2010/main" id="1" dur="indefinite" restart="never" nodeType="tmRoot"/>
+      </p:par>
+    </p:tnLst>
+  </p:timing>
+</p:sld>
+</file>
+
+<file path=ppt/slides/slide51.xml><?xml version="1.0" encoding="utf-8"?>
+<p:sld xmlns:a="http://schemas.openxmlformats.org/drawingml/2006/main" xmlns:r="http://schemas.openxmlformats.org/officeDocument/2006/relationships" xmlns:p="http://schemas.openxmlformats.org/presentationml/2006/main">
+  <p:cSld>
+    <p:spTree>
+      <p:nvGrpSpPr>
+        <p:cNvPr id="1" name=""/>
+        <p:cNvGrpSpPr/>
+        <p:nvPr/>
+      </p:nvGrpSpPr>
+      <p:grpSpPr>
+        <a:xfrm>
+          <a:off x="0" y="0"/>
+          <a:ext cx="0" cy="0"/>
+          <a:chOff x="0" y="0"/>
+          <a:chExt cx="0" cy="0"/>
+        </a:xfrm>
+      </p:grpSpPr>
+      <p:sp>
+        <p:nvSpPr>
+          <p:cNvPr id="2" name="Title 1"/>
+          <p:cNvSpPr>
+            <a:spLocks noGrp="1"/>
+          </p:cNvSpPr>
+          <p:nvPr>
+            <p:ph type="title"/>
+          </p:nvPr>
+        </p:nvSpPr>
+        <p:spPr>
+          <a:xfrm>
+            <a:off x="549275" y="107576"/>
+            <a:ext cx="8042276" cy="1052357"/>
+          </a:xfrm>
+        </p:spPr>
+        <p:txBody>
+          <a:bodyPr/>
+          <a:lstStyle/>
+          <a:p>
+            <a:r>
+              <a:rPr lang="en-US" sz="4400" dirty="0" err="1" smtClean="0"/>
+              <a:t>c.g.g.collect.Multimap</a:t>
+            </a:r>
+            <a:endParaRPr lang="en-US" sz="4400" dirty="0"/>
+          </a:p>
+        </p:txBody>
+      </p:sp>
+      <p:sp>
+        <p:nvSpPr>
+          <p:cNvPr id="3" name="Content Placeholder 2"/>
+          <p:cNvSpPr>
+            <a:spLocks noGrp="1"/>
+          </p:cNvSpPr>
+          <p:nvPr>
+            <p:ph idx="1"/>
+          </p:nvPr>
+        </p:nvSpPr>
+        <p:spPr>
+          <a:xfrm>
+            <a:off x="549275" y="1350433"/>
+            <a:ext cx="8042276" cy="4965700"/>
+          </a:xfrm>
+        </p:spPr>
+        <p:txBody>
+          <a:bodyPr numCol="1">
+            <a:normAutofit/>
+          </a:bodyPr>
+          <a:lstStyle/>
+          <a:p>
+            <a:r>
+              <a:rPr lang="en-US" sz="3000" dirty="0" smtClean="0">
+                <a:latin typeface="News Gothic MT"/>
+                <a:cs typeface="News Gothic MT"/>
+              </a:rPr>
+              <a:t>Similar to </a:t>
+            </a:r>
+            <a:r>
+              <a:rPr lang="en-US" sz="2800" dirty="0" err="1" smtClean="0">
+                <a:latin typeface="Monaco"/>
+                <a:cs typeface="Monaco"/>
+              </a:rPr>
+              <a:t>java.util.Map</a:t>
+            </a:r>
+            <a:r>
+              <a:rPr lang="en-US" sz="3000" dirty="0" smtClean="0">
+                <a:latin typeface="News Gothic MT"/>
+                <a:cs typeface="News Gothic MT"/>
+              </a:rPr>
+              <a:t>, but multiple values can be associated with same key</a:t>
+            </a:r>
+          </a:p>
+          <a:p>
+            <a:r>
+              <a:rPr lang="en-US" sz="3000" dirty="0" smtClean="0">
+                <a:latin typeface="News Gothic MT"/>
+                <a:cs typeface="News Gothic MT"/>
+              </a:rPr>
+              <a:t>Implementations:</a:t>
+            </a:r>
+          </a:p>
+          <a:p>
+            <a:pPr lvl="1"/>
+            <a:r>
+              <a:rPr lang="en-US" sz="2800" dirty="0" err="1" smtClean="0">
+                <a:latin typeface="News Gothic MT"/>
+                <a:cs typeface="News Gothic MT"/>
+              </a:rPr>
+              <a:t>ListMultimap</a:t>
+            </a:r>
+            <a:endParaRPr lang="en-US" sz="2800" dirty="0" smtClean="0">
+              <a:latin typeface="News Gothic MT"/>
+              <a:cs typeface="News Gothic MT"/>
+            </a:endParaRPr>
+          </a:p>
+          <a:p>
+            <a:pPr lvl="1"/>
+            <a:r>
+              <a:rPr lang="en-US" sz="2800" dirty="0" err="1" smtClean="0">
+                <a:latin typeface="News Gothic MT"/>
+                <a:cs typeface="News Gothic MT"/>
+              </a:rPr>
+              <a:t>SetMultimap</a:t>
+            </a:r>
+            <a:endParaRPr lang="en-US" sz="2800" dirty="0" smtClean="0">
+              <a:latin typeface="News Gothic MT"/>
+              <a:cs typeface="News Gothic MT"/>
+            </a:endParaRPr>
+          </a:p>
+          <a:p>
+            <a:pPr lvl="1"/>
+            <a:r>
+              <a:rPr lang="en-US" sz="2800" dirty="0" err="1" smtClean="0">
+                <a:cs typeface="News Gothic MT"/>
+              </a:rPr>
+              <a:t>SortedSetMultimap</a:t>
+            </a:r>
+            <a:endParaRPr lang="en-US" sz="2800" dirty="0" smtClean="0">
+              <a:cs typeface="News Gothic MT"/>
+            </a:endParaRPr>
+          </a:p>
+          <a:p>
+            <a:r>
+              <a:rPr lang="en-US" sz="3000" dirty="0" smtClean="0">
+                <a:cs typeface="News Gothic MT"/>
+              </a:rPr>
+              <a:t>Good structure for representing one-to-many (e.g. parent-child) object relationships</a:t>
+            </a:r>
+            <a:endParaRPr lang="en-US" sz="3000" dirty="0">
+              <a:cs typeface="News Gothic MT"/>
+            </a:endParaRPr>
+          </a:p>
+        </p:txBody>
+      </p:sp>
+    </p:spTree>
+    <p:extLst>
+      <p:ext uri="{BB962C8B-B14F-4D97-AF65-F5344CB8AC3E}">
+        <p14:creationId xmlns:p14="http://schemas.microsoft.com/office/powerpoint/2010/main" val="3227346751"/>
+      </p:ext>
+    </p:extLst>
+  </p:cSld>
+  <p:clrMapOvr>
+    <a:masterClrMapping/>
+  </p:clrMapOvr>
+  <p:timing>
+    <p:tnLst>
+      <p:par>
+        <p:cTn xmlns:p14="http://schemas.microsoft.com/office/powerpoint/2010/main" id="1" dur="indefinite" restart="never" nodeType="tmRoot"/>
+      </p:par>
+    </p:tnLst>
+  </p:timing>
+</p:sld>
+</file>
+
+<file path=ppt/slides/slide52.xml><?xml version="1.0" encoding="utf-8"?>
+<p:sld xmlns:a="http://schemas.openxmlformats.org/drawingml/2006/main" xmlns:r="http://schemas.openxmlformats.org/officeDocument/2006/relationships" xmlns:p="http://schemas.openxmlformats.org/presentationml/2006/main">
+  <p:cSld>
+    <p:spTree>
+      <p:nvGrpSpPr>
+        <p:cNvPr id="1" name=""/>
+        <p:cNvGrpSpPr/>
+        <p:nvPr/>
+      </p:nvGrpSpPr>
+      <p:grpSpPr>
+        <a:xfrm>
+          <a:off x="0" y="0"/>
+          <a:ext cx="0" cy="0"/>
+          <a:chOff x="0" y="0"/>
+          <a:chExt cx="0" cy="0"/>
+        </a:xfrm>
+      </p:grpSpPr>
+      <p:sp>
+        <p:nvSpPr>
+          <p:cNvPr id="2" name="Title 1"/>
+          <p:cNvSpPr>
+            <a:spLocks noGrp="1"/>
+          </p:cNvSpPr>
+          <p:nvPr>
+            <p:ph type="title"/>
+          </p:nvPr>
+        </p:nvSpPr>
+        <p:spPr>
+          <a:xfrm>
+            <a:off x="549275" y="268443"/>
+            <a:ext cx="8042276" cy="823757"/>
+          </a:xfrm>
+        </p:spPr>
+        <p:txBody>
+          <a:bodyPr/>
+          <a:lstStyle/>
+          <a:p>
+            <a:r>
+              <a:rPr lang="en-US" sz="4000" dirty="0" err="1" smtClean="0"/>
+              <a:t>ListMultimap</a:t>
+            </a:r>
+            <a:r>
+              <a:rPr lang="en-US" sz="4000" dirty="0" smtClean="0"/>
+              <a:t> example</a:t>
+            </a:r>
+            <a:endParaRPr lang="en-US" sz="4000" dirty="0"/>
+          </a:p>
+        </p:txBody>
+      </p:sp>
+      <p:sp>
+        <p:nvSpPr>
+          <p:cNvPr id="3" name="Content Placeholder 2"/>
+          <p:cNvSpPr>
+            <a:spLocks noGrp="1"/>
+          </p:cNvSpPr>
+          <p:nvPr>
+            <p:ph idx="1"/>
+          </p:nvPr>
+        </p:nvSpPr>
+        <p:spPr>
+          <a:xfrm>
+            <a:off x="440267" y="1483917"/>
+            <a:ext cx="8151284" cy="4942283"/>
+          </a:xfrm>
+        </p:spPr>
+        <p:txBody>
+          <a:bodyPr>
+            <a:noAutofit/>
+          </a:bodyPr>
+          <a:lstStyle/>
+          <a:p>
+            <a:pPr marL="0" indent="0">
+              <a:lnSpc>
+                <a:spcPts val="700"/>
+              </a:lnSpc>
+              <a:buNone/>
+            </a:pPr>
+            <a:endParaRPr lang="en-US" sz="2000" dirty="0">
+              <a:latin typeface="Monaco"/>
+              <a:cs typeface="Monaco"/>
+            </a:endParaRPr>
+          </a:p>
+          <a:p>
+            <a:pPr marL="0" indent="0">
+              <a:lnSpc>
+                <a:spcPts val="700"/>
+              </a:lnSpc>
+              <a:buNone/>
+            </a:pPr>
+            <a:r>
+              <a:rPr lang="en-US" sz="2000" dirty="0">
+                <a:latin typeface="Monaco"/>
+                <a:cs typeface="Monaco"/>
+              </a:rPr>
+              <a:t>@Test</a:t>
+            </a:r>
+          </a:p>
+          <a:p>
+            <a:pPr marL="0" indent="0">
+              <a:lnSpc>
+                <a:spcPts val="700"/>
+              </a:lnSpc>
+              <a:buNone/>
+            </a:pPr>
+            <a:r>
+              <a:rPr lang="en-US" sz="2000" dirty="0">
+                <a:latin typeface="Monaco"/>
+                <a:cs typeface="Monaco"/>
+              </a:rPr>
+              <a:t>public void </a:t>
+            </a:r>
+            <a:r>
+              <a:rPr lang="en-US" sz="2000" dirty="0" err="1" smtClean="0">
+                <a:latin typeface="Monaco"/>
+                <a:cs typeface="Monaco"/>
+              </a:rPr>
+              <a:t>addsMultipleValuesWithSameKey</a:t>
+            </a:r>
+            <a:r>
+              <a:rPr lang="en-US" sz="2000" dirty="0">
+                <a:latin typeface="Monaco"/>
+                <a:cs typeface="Monaco"/>
+              </a:rPr>
+              <a:t>() {</a:t>
+            </a:r>
+          </a:p>
+          <a:p>
+            <a:pPr marL="0" indent="0">
+              <a:lnSpc>
+                <a:spcPts val="700"/>
+              </a:lnSpc>
+              <a:buNone/>
+            </a:pPr>
+            <a:r>
+              <a:rPr lang="en-US" sz="2000" dirty="0">
+                <a:latin typeface="Monaco"/>
+                <a:cs typeface="Monaco"/>
+              </a:rPr>
+              <a:t>    </a:t>
+            </a:r>
+            <a:r>
+              <a:rPr lang="en-US" sz="2000" b="1" i="1" dirty="0" err="1">
+                <a:solidFill>
+                  <a:srgbClr val="586215"/>
+                </a:solidFill>
+                <a:latin typeface="Monaco"/>
+                <a:cs typeface="Monaco"/>
+              </a:rPr>
+              <a:t>ListMultimap</a:t>
+            </a:r>
+            <a:r>
+              <a:rPr lang="en-US" sz="2000" dirty="0">
+                <a:latin typeface="Monaco"/>
+                <a:cs typeface="Monaco"/>
+              </a:rPr>
+              <a:t>&lt;String, String&gt; </a:t>
+            </a:r>
+            <a:r>
+              <a:rPr lang="en-US" sz="2000" dirty="0" err="1">
+                <a:latin typeface="Monaco"/>
+                <a:cs typeface="Monaco"/>
+              </a:rPr>
+              <a:t>citiesByState</a:t>
+            </a:r>
+            <a:r>
+              <a:rPr lang="en-US" sz="2000" dirty="0">
+                <a:latin typeface="Monaco"/>
+                <a:cs typeface="Monaco"/>
+              </a:rPr>
+              <a:t> =</a:t>
+            </a:r>
+          </a:p>
+          <a:p>
+            <a:pPr marL="0" indent="0">
+              <a:lnSpc>
+                <a:spcPts val="700"/>
+              </a:lnSpc>
+              <a:buNone/>
+            </a:pPr>
+            <a:r>
+              <a:rPr lang="en-US" sz="2000" dirty="0">
+                <a:latin typeface="Monaco"/>
+                <a:cs typeface="Monaco"/>
+              </a:rPr>
+              <a:t>            </a:t>
+            </a:r>
+            <a:r>
+              <a:rPr lang="en-US" sz="2000" b="1" i="1" dirty="0" err="1">
+                <a:solidFill>
+                  <a:srgbClr val="586215"/>
+                </a:solidFill>
+                <a:latin typeface="Monaco"/>
+                <a:cs typeface="Monaco"/>
+              </a:rPr>
+              <a:t>ArrayListMultimap.create</a:t>
+            </a:r>
+            <a:r>
+              <a:rPr lang="en-US" sz="2000" dirty="0">
+                <a:latin typeface="Monaco"/>
+                <a:cs typeface="Monaco"/>
+              </a:rPr>
+              <a:t>();</a:t>
+            </a:r>
+          </a:p>
+          <a:p>
+            <a:pPr marL="0" indent="0">
+              <a:lnSpc>
+                <a:spcPts val="700"/>
+              </a:lnSpc>
+              <a:buNone/>
+            </a:pPr>
+            <a:r>
+              <a:rPr lang="en-US" sz="2000" dirty="0">
+                <a:latin typeface="Monaco"/>
+                <a:cs typeface="Monaco"/>
+              </a:rPr>
+              <a:t>    </a:t>
+            </a:r>
+            <a:r>
+              <a:rPr lang="en-US" sz="2000" dirty="0" err="1">
+                <a:latin typeface="Monaco"/>
+                <a:cs typeface="Monaco"/>
+              </a:rPr>
+              <a:t>citiesByState.put</a:t>
+            </a:r>
+            <a:r>
+              <a:rPr lang="en-US" sz="2000" dirty="0">
+                <a:latin typeface="Monaco"/>
+                <a:cs typeface="Monaco"/>
+              </a:rPr>
+              <a:t>("TX", "Austin");</a:t>
+            </a:r>
+          </a:p>
+          <a:p>
+            <a:pPr marL="0" indent="0">
+              <a:lnSpc>
+                <a:spcPts val="700"/>
+              </a:lnSpc>
+              <a:buNone/>
+            </a:pPr>
+            <a:r>
+              <a:rPr lang="en-US" sz="2000" dirty="0">
+                <a:latin typeface="Monaco"/>
+                <a:cs typeface="Monaco"/>
+              </a:rPr>
+              <a:t>    </a:t>
+            </a:r>
+            <a:r>
+              <a:rPr lang="en-US" sz="2000" dirty="0" err="1">
+                <a:latin typeface="Monaco"/>
+                <a:cs typeface="Monaco"/>
+              </a:rPr>
+              <a:t>citiesByState.put</a:t>
+            </a:r>
+            <a:r>
+              <a:rPr lang="en-US" sz="2000" dirty="0">
+                <a:latin typeface="Monaco"/>
+                <a:cs typeface="Monaco"/>
+              </a:rPr>
+              <a:t>("TX", "Dallas");</a:t>
+            </a:r>
+          </a:p>
+          <a:p>
+            <a:pPr marL="0" indent="0">
+              <a:lnSpc>
+                <a:spcPts val="700"/>
+              </a:lnSpc>
+              <a:buNone/>
+            </a:pPr>
+            <a:endParaRPr lang="en-US" sz="2000" dirty="0">
+              <a:latin typeface="Monaco"/>
+              <a:cs typeface="Monaco"/>
+            </a:endParaRPr>
+          </a:p>
+          <a:p>
+            <a:pPr marL="0" indent="0">
+              <a:lnSpc>
+                <a:spcPts val="700"/>
+              </a:lnSpc>
+              <a:buNone/>
+            </a:pPr>
+            <a:r>
+              <a:rPr lang="en-US" sz="2000" dirty="0">
+                <a:latin typeface="Monaco"/>
+                <a:cs typeface="Monaco"/>
+              </a:rPr>
+              <a:t>    List&lt;String&gt; cities = </a:t>
+            </a:r>
+            <a:r>
+              <a:rPr lang="en-US" sz="2000" dirty="0" err="1">
+                <a:latin typeface="Monaco"/>
+                <a:cs typeface="Monaco"/>
+              </a:rPr>
+              <a:t>citiesByState.</a:t>
+            </a:r>
+            <a:r>
+              <a:rPr lang="en-US" sz="2000" b="1" i="1" dirty="0" err="1">
+                <a:solidFill>
+                  <a:srgbClr val="586215"/>
+                </a:solidFill>
+                <a:latin typeface="Monaco"/>
+                <a:cs typeface="Monaco"/>
+              </a:rPr>
+              <a:t>get</a:t>
+            </a:r>
+            <a:r>
+              <a:rPr lang="en-US" sz="2000" dirty="0">
+                <a:latin typeface="Monaco"/>
+                <a:cs typeface="Monaco"/>
+              </a:rPr>
+              <a:t>("TX");</a:t>
+            </a:r>
+          </a:p>
+          <a:p>
+            <a:pPr marL="0" indent="0">
+              <a:lnSpc>
+                <a:spcPts val="700"/>
+              </a:lnSpc>
+              <a:buNone/>
+            </a:pPr>
+            <a:endParaRPr lang="en-US" sz="2000" dirty="0">
+              <a:latin typeface="Monaco"/>
+              <a:cs typeface="Monaco"/>
+            </a:endParaRPr>
+          </a:p>
+          <a:p>
+            <a:pPr marL="0" indent="0">
+              <a:lnSpc>
+                <a:spcPts val="700"/>
+              </a:lnSpc>
+              <a:buNone/>
+            </a:pPr>
+            <a:r>
+              <a:rPr lang="en-US" sz="2000" dirty="0">
+                <a:latin typeface="Monaco"/>
+                <a:cs typeface="Monaco"/>
+              </a:rPr>
+              <a:t>    </a:t>
+            </a:r>
+            <a:r>
+              <a:rPr lang="en-US" sz="2000" dirty="0" err="1">
+                <a:latin typeface="Monaco"/>
+                <a:cs typeface="Monaco"/>
+              </a:rPr>
+              <a:t>assertEquals</a:t>
+            </a:r>
+            <a:r>
+              <a:rPr lang="en-US" sz="2000" dirty="0">
+                <a:latin typeface="Monaco"/>
+                <a:cs typeface="Monaco"/>
+              </a:rPr>
+              <a:t>(2, </a:t>
+            </a:r>
+            <a:r>
+              <a:rPr lang="en-US" sz="2000" dirty="0" err="1">
+                <a:latin typeface="Monaco"/>
+                <a:cs typeface="Monaco"/>
+              </a:rPr>
+              <a:t>cities.size</a:t>
+            </a:r>
+            <a:r>
+              <a:rPr lang="en-US" sz="2000" dirty="0">
+                <a:latin typeface="Monaco"/>
+                <a:cs typeface="Monaco"/>
+              </a:rPr>
+              <a:t>());</a:t>
+            </a:r>
+          </a:p>
+          <a:p>
+            <a:pPr marL="0" indent="0">
+              <a:lnSpc>
+                <a:spcPts val="700"/>
+              </a:lnSpc>
+              <a:buNone/>
+            </a:pPr>
+            <a:r>
+              <a:rPr lang="en-US" sz="2000" dirty="0">
+                <a:latin typeface="Monaco"/>
+                <a:cs typeface="Monaco"/>
+              </a:rPr>
+              <a:t>    </a:t>
+            </a:r>
+            <a:r>
+              <a:rPr lang="en-US" sz="2000" dirty="0" err="1">
+                <a:latin typeface="Monaco"/>
+                <a:cs typeface="Monaco"/>
+              </a:rPr>
+              <a:t>assertTrue</a:t>
+            </a:r>
+            <a:r>
+              <a:rPr lang="en-US" sz="2000" dirty="0">
+                <a:latin typeface="Monaco"/>
+                <a:cs typeface="Monaco"/>
+              </a:rPr>
+              <a:t>(</a:t>
+            </a:r>
+            <a:r>
+              <a:rPr lang="en-US" sz="2000" dirty="0" err="1">
+                <a:latin typeface="Monaco"/>
+                <a:cs typeface="Monaco"/>
+              </a:rPr>
+              <a:t>cities.contains</a:t>
+            </a:r>
+            <a:r>
+              <a:rPr lang="en-US" sz="2000" dirty="0">
+                <a:latin typeface="Monaco"/>
+                <a:cs typeface="Monaco"/>
+              </a:rPr>
+              <a:t>("Dallas"));</a:t>
+            </a:r>
+          </a:p>
+          <a:p>
+            <a:pPr marL="0" indent="0">
+              <a:lnSpc>
+                <a:spcPts val="700"/>
+              </a:lnSpc>
+              <a:buNone/>
+            </a:pPr>
+            <a:r>
+              <a:rPr lang="en-US" sz="2000" dirty="0">
+                <a:latin typeface="Monaco"/>
+                <a:cs typeface="Monaco"/>
+              </a:rPr>
+              <a:t>    </a:t>
+            </a:r>
+            <a:r>
+              <a:rPr lang="en-US" sz="2000" dirty="0" err="1">
+                <a:latin typeface="Monaco"/>
+                <a:cs typeface="Monaco"/>
+              </a:rPr>
+              <a:t>assertTrue</a:t>
+            </a:r>
+            <a:r>
+              <a:rPr lang="en-US" sz="2000" dirty="0">
+                <a:latin typeface="Monaco"/>
+                <a:cs typeface="Monaco"/>
+              </a:rPr>
+              <a:t>(</a:t>
+            </a:r>
+            <a:r>
+              <a:rPr lang="en-US" sz="2000" dirty="0" err="1">
+                <a:latin typeface="Monaco"/>
+                <a:cs typeface="Monaco"/>
+              </a:rPr>
+              <a:t>cities.contains</a:t>
+            </a:r>
+            <a:r>
+              <a:rPr lang="en-US" sz="2000" dirty="0">
+                <a:latin typeface="Monaco"/>
+                <a:cs typeface="Monaco"/>
+              </a:rPr>
+              <a:t>("Austin"));</a:t>
+            </a:r>
+          </a:p>
+          <a:p>
+            <a:pPr marL="0" indent="0">
+              <a:lnSpc>
+                <a:spcPts val="700"/>
+              </a:lnSpc>
+              <a:buNone/>
+            </a:pPr>
+            <a:r>
+              <a:rPr lang="en-US" sz="2000" dirty="0" smtClean="0">
+                <a:latin typeface="Monaco"/>
+                <a:cs typeface="Monaco"/>
+              </a:rPr>
+              <a:t>}</a:t>
+            </a:r>
+            <a:endParaRPr lang="en-US" sz="2000" dirty="0">
+              <a:latin typeface="Monaco"/>
+              <a:cs typeface="Monaco"/>
+            </a:endParaRPr>
+          </a:p>
+        </p:txBody>
+      </p:sp>
+    </p:spTree>
+    <p:extLst>
+      <p:ext uri="{BB962C8B-B14F-4D97-AF65-F5344CB8AC3E}">
+        <p14:creationId xmlns:p14="http://schemas.microsoft.com/office/powerpoint/2010/main" val="2043583152"/>
       </p:ext>
     </p:extLst>
   </p:cSld>

</xml_diff>

<commit_message>
Final touch ups before presentation.
</commit_message>
<xml_diff>
--- a/JavaMUG - Guava.pptx
+++ b/JavaMUG - Guava.pptx
@@ -5,7 +5,7 @@
     <p:sldMasterId id="2147483660" r:id="rId1"/>
   </p:sldMasterIdLst>
   <p:notesMasterIdLst>
-    <p:notesMasterId r:id="rId53"/>
+    <p:notesMasterId r:id="rId56"/>
   </p:notesMasterIdLst>
   <p:sldIdLst>
     <p:sldId id="256" r:id="rId2"/>
@@ -59,6 +59,9 @@
     <p:sldId id="318" r:id="rId50"/>
     <p:sldId id="319" r:id="rId51"/>
     <p:sldId id="320" r:id="rId52"/>
+    <p:sldId id="324" r:id="rId53"/>
+    <p:sldId id="325" r:id="rId54"/>
+    <p:sldId id="323" r:id="rId55"/>
   </p:sldIdLst>
   <p:sldSz cx="9144000" cy="6858000" type="screen4x3"/>
   <p:notesSz cx="6858000" cy="9144000"/>
@@ -242,7 +245,7 @@
           <a:p>
             <a:fld id="{8D7C17D1-822C-D245-8E59-CC30A49789B4}" type="datetimeFigureOut">
               <a:rPr lang="en-US" smtClean="0"/>
-              <a:t>9/11/11</a:t>
+              <a:t>9/14/11</a:t>
             </a:fld>
             <a:endParaRPr lang="en-US"/>
           </a:p>
@@ -1117,7 +1120,7 @@
           <a:p>
             <a:fld id="{B01F9CA3-105E-4857-9057-6DB6197DA786}" type="datetimeFigureOut">
               <a:rPr lang="en-US" smtClean="0"/>
-              <a:t>9/11/11</a:t>
+              <a:t>9/14/11</a:t>
             </a:fld>
             <a:endParaRPr lang="en-US"/>
           </a:p>
@@ -1309,7 +1312,7 @@
           <a:p>
             <a:fld id="{B01F9CA3-105E-4857-9057-6DB6197DA786}" type="datetimeFigureOut">
               <a:rPr lang="en-US" smtClean="0"/>
-              <a:t>9/11/11</a:t>
+              <a:t>9/14/11</a:t>
             </a:fld>
             <a:endParaRPr lang="en-US"/>
           </a:p>
@@ -1606,7 +1609,7 @@
           <a:p>
             <a:fld id="{B01F9CA3-105E-4857-9057-6DB6197DA786}" type="datetimeFigureOut">
               <a:rPr lang="en-US" smtClean="0"/>
-              <a:t>9/11/11</a:t>
+              <a:t>9/14/11</a:t>
             </a:fld>
             <a:endParaRPr lang="en-US"/>
           </a:p>
@@ -1813,7 +1816,7 @@
           <a:p>
             <a:fld id="{B01F9CA3-105E-4857-9057-6DB6197DA786}" type="datetimeFigureOut">
               <a:rPr lang="en-US" smtClean="0"/>
-              <a:t>9/11/11</a:t>
+              <a:t>9/14/11</a:t>
             </a:fld>
             <a:endParaRPr lang="en-US"/>
           </a:p>
@@ -2010,7 +2013,7 @@
           <a:p>
             <a:fld id="{B01F9CA3-105E-4857-9057-6DB6197DA786}" type="datetimeFigureOut">
               <a:rPr lang="en-US" smtClean="0"/>
-              <a:t>9/11/11</a:t>
+              <a:t>9/14/11</a:t>
             </a:fld>
             <a:endParaRPr lang="en-US"/>
           </a:p>
@@ -2252,7 +2255,7 @@
           <a:p>
             <a:fld id="{B01F9CA3-105E-4857-9057-6DB6197DA786}" type="datetimeFigureOut">
               <a:rPr lang="en-US" smtClean="0"/>
-              <a:t>9/11/11</a:t>
+              <a:t>9/14/11</a:t>
             </a:fld>
             <a:endParaRPr lang="en-US"/>
           </a:p>
@@ -2575,7 +2578,7 @@
           <a:p>
             <a:fld id="{B01F9CA3-105E-4857-9057-6DB6197DA786}" type="datetimeFigureOut">
               <a:rPr lang="en-US" smtClean="0"/>
-              <a:t>9/11/11</a:t>
+              <a:t>9/14/11</a:t>
             </a:fld>
             <a:endParaRPr lang="en-US"/>
           </a:p>
@@ -2929,7 +2932,7 @@
           <a:p>
             <a:fld id="{B01F9CA3-105E-4857-9057-6DB6197DA786}" type="datetimeFigureOut">
               <a:rPr lang="en-US" smtClean="0"/>
-              <a:t>9/11/11</a:t>
+              <a:t>9/14/11</a:t>
             </a:fld>
             <a:endParaRPr lang="en-US"/>
           </a:p>
@@ -3441,7 +3444,7 @@
           <a:p>
             <a:fld id="{B01F9CA3-105E-4857-9057-6DB6197DA786}" type="datetimeFigureOut">
               <a:rPr lang="en-US" smtClean="0"/>
-              <a:t>9/11/11</a:t>
+              <a:t>9/14/11</a:t>
             </a:fld>
             <a:endParaRPr lang="en-US"/>
           </a:p>
@@ -3554,7 +3557,7 @@
           <a:p>
             <a:fld id="{B01F9CA3-105E-4857-9057-6DB6197DA786}" type="datetimeFigureOut">
               <a:rPr lang="en-US" smtClean="0"/>
-              <a:t>9/11/11</a:t>
+              <a:t>9/14/11</a:t>
             </a:fld>
             <a:endParaRPr lang="en-US"/>
           </a:p>
@@ -3644,7 +3647,7 @@
           <a:p>
             <a:fld id="{B01F9CA3-105E-4857-9057-6DB6197DA786}" type="datetimeFigureOut">
               <a:rPr lang="en-US" smtClean="0"/>
-              <a:t>9/11/11</a:t>
+              <a:t>9/14/11</a:t>
             </a:fld>
             <a:endParaRPr lang="en-US"/>
           </a:p>
@@ -3954,7 +3957,7 @@
           <a:p>
             <a:fld id="{B01F9CA3-105E-4857-9057-6DB6197DA786}" type="datetimeFigureOut">
               <a:rPr lang="en-US" smtClean="0"/>
-              <a:t>9/11/11</a:t>
+              <a:t>9/14/11</a:t>
             </a:fld>
             <a:endParaRPr lang="en-US"/>
           </a:p>
@@ -4188,7 +4191,7 @@
           <a:p>
             <a:fld id="{B01F9CA3-105E-4857-9057-6DB6197DA786}" type="datetimeFigureOut">
               <a:rPr lang="en-US" smtClean="0"/>
-              <a:t>9/11/11</a:t>
+              <a:t>9/14/11</a:t>
             </a:fld>
             <a:endParaRPr lang="en-US"/>
           </a:p>
@@ -16946,10 +16949,6 @@
               </a:rPr>
               <a:t>Maps</a:t>
             </a:r>
-            <a:endParaRPr lang="en-US" sz="2800" dirty="0" smtClean="0">
-              <a:latin typeface="News Gothic MT"/>
-              <a:cs typeface="News Gothic MT"/>
-            </a:endParaRPr>
           </a:p>
           <a:p>
             <a:pPr lvl="1"/>
@@ -19066,10 +19065,6 @@
               </a:rPr>
               <a:t>Preserves uniqueness of value as well as keys</a:t>
             </a:r>
-            <a:endParaRPr lang="en-US" sz="3000" dirty="0" smtClean="0">
-              <a:latin typeface="News Gothic MT"/>
-              <a:cs typeface="News Gothic MT"/>
-            </a:endParaRPr>
           </a:p>
         </p:txBody>
       </p:sp>
@@ -20037,6 +20032,477 @@
     <p:extLst>
       <p:ext uri="{BB962C8B-B14F-4D97-AF65-F5344CB8AC3E}">
         <p14:creationId xmlns:p14="http://schemas.microsoft.com/office/powerpoint/2010/main" val="1385168695"/>
+      </p:ext>
+    </p:extLst>
+  </p:cSld>
+  <p:clrMapOvr>
+    <a:masterClrMapping/>
+  </p:clrMapOvr>
+  <p:timing>
+    <p:tnLst>
+      <p:par>
+        <p:cTn xmlns:p14="http://schemas.microsoft.com/office/powerpoint/2010/main" id="1" dur="indefinite" restart="never" nodeType="tmRoot"/>
+      </p:par>
+    </p:tnLst>
+  </p:timing>
+</p:sld>
+</file>
+
+<file path=ppt/slides/slide52.xml><?xml version="1.0" encoding="utf-8"?>
+<p:sld xmlns:a="http://schemas.openxmlformats.org/drawingml/2006/main" xmlns:r="http://schemas.openxmlformats.org/officeDocument/2006/relationships" xmlns:p="http://schemas.openxmlformats.org/presentationml/2006/main">
+  <p:cSld>
+    <p:spTree>
+      <p:nvGrpSpPr>
+        <p:cNvPr id="1" name=""/>
+        <p:cNvGrpSpPr/>
+        <p:nvPr/>
+      </p:nvGrpSpPr>
+      <p:grpSpPr>
+        <a:xfrm>
+          <a:off x="0" y="0"/>
+          <a:ext cx="0" cy="0"/>
+          <a:chOff x="0" y="0"/>
+          <a:chExt cx="0" cy="0"/>
+        </a:xfrm>
+      </p:grpSpPr>
+      <p:sp>
+        <p:nvSpPr>
+          <p:cNvPr id="2" name="Title 1"/>
+          <p:cNvSpPr>
+            <a:spLocks noGrp="1"/>
+          </p:cNvSpPr>
+          <p:nvPr>
+            <p:ph type="title"/>
+          </p:nvPr>
+        </p:nvSpPr>
+        <p:spPr>
+          <a:xfrm>
+            <a:off x="549275" y="107576"/>
+            <a:ext cx="8042276" cy="1052357"/>
+          </a:xfrm>
+        </p:spPr>
+        <p:txBody>
+          <a:bodyPr/>
+          <a:lstStyle/>
+          <a:p>
+            <a:r>
+              <a:rPr lang="en-US" sz="4400" dirty="0" err="1" smtClean="0"/>
+              <a:t>c.g.c.collect.MapMaker</a:t>
+            </a:r>
+            <a:endParaRPr lang="en-US" sz="4400" dirty="0"/>
+          </a:p>
+        </p:txBody>
+      </p:sp>
+      <p:sp>
+        <p:nvSpPr>
+          <p:cNvPr id="3" name="Content Placeholder 2"/>
+          <p:cNvSpPr>
+            <a:spLocks noGrp="1"/>
+          </p:cNvSpPr>
+          <p:nvPr>
+            <p:ph idx="1"/>
+          </p:nvPr>
+        </p:nvSpPr>
+        <p:spPr>
+          <a:xfrm>
+            <a:off x="549275" y="1350433"/>
+            <a:ext cx="8042276" cy="4965700"/>
+          </a:xfrm>
+        </p:spPr>
+        <p:txBody>
+          <a:bodyPr numCol="1">
+            <a:normAutofit/>
+          </a:bodyPr>
+          <a:lstStyle/>
+          <a:p>
+            <a:r>
+              <a:rPr lang="en-US" sz="3000" dirty="0" smtClean="0">
+                <a:latin typeface="News Gothic MT"/>
+                <a:cs typeface="News Gothic MT"/>
+              </a:rPr>
+              <a:t>Builder for creating instances of </a:t>
+            </a:r>
+            <a:r>
+              <a:rPr lang="en-US" sz="2800" dirty="0" err="1" smtClean="0">
+                <a:latin typeface="Monaco"/>
+                <a:cs typeface="Monaco"/>
+              </a:rPr>
+              <a:t>java.util.concurrent.ConcurrentMap</a:t>
+            </a:r>
+            <a:endParaRPr lang="en-US" sz="2800" dirty="0" smtClean="0">
+              <a:latin typeface="Monaco"/>
+              <a:cs typeface="Monaco"/>
+            </a:endParaRPr>
+          </a:p>
+          <a:p>
+            <a:r>
+              <a:rPr lang="en-US" sz="3000" dirty="0">
+                <a:latin typeface="News Gothic MT"/>
+                <a:cs typeface="News Gothic MT"/>
+              </a:rPr>
+              <a:t>Allows</a:t>
+            </a:r>
+            <a:r>
+              <a:rPr lang="en-US" sz="3000" dirty="0">
+                <a:latin typeface="News Gothic MT"/>
+                <a:cs typeface="News Gothic MT"/>
+              </a:rPr>
+              <a:t> configuration </a:t>
+            </a:r>
+            <a:r>
+              <a:rPr lang="en-US" sz="3000" dirty="0" smtClean="0">
+                <a:latin typeface="News Gothic MT"/>
+                <a:cs typeface="News Gothic MT"/>
+              </a:rPr>
+              <a:t>of:</a:t>
+            </a:r>
+          </a:p>
+          <a:p>
+            <a:pPr lvl="1"/>
+            <a:r>
+              <a:rPr lang="en-US" sz="2800" dirty="0" smtClean="0">
+                <a:latin typeface="News Gothic MT"/>
+                <a:cs typeface="News Gothic MT"/>
+              </a:rPr>
+              <a:t>Soft/weak keys and values</a:t>
+            </a:r>
+          </a:p>
+          <a:p>
+            <a:pPr lvl="1"/>
+            <a:r>
+              <a:rPr lang="en-US" sz="2800" dirty="0" smtClean="0">
+                <a:latin typeface="News Gothic MT"/>
+                <a:cs typeface="News Gothic MT"/>
+              </a:rPr>
+              <a:t>Concurrency level</a:t>
+            </a:r>
+          </a:p>
+          <a:p>
+            <a:pPr lvl="1"/>
+            <a:r>
+              <a:rPr lang="en-US" sz="2800" dirty="0" smtClean="0">
+                <a:latin typeface="News Gothic MT"/>
+                <a:cs typeface="News Gothic MT"/>
+              </a:rPr>
+              <a:t>Entry expiration</a:t>
+            </a:r>
+            <a:endParaRPr lang="en-US" sz="3200" dirty="0">
+              <a:latin typeface="News Gothic MT"/>
+              <a:cs typeface="News Gothic MT"/>
+            </a:endParaRPr>
+          </a:p>
+          <a:p>
+            <a:r>
+              <a:rPr lang="en-US" sz="3000" dirty="0" smtClean="0">
+                <a:latin typeface="News Gothic MT"/>
+                <a:cs typeface="News Gothic MT"/>
+              </a:rPr>
+              <a:t>Can compute values for keys</a:t>
+            </a:r>
+            <a:r>
+              <a:rPr lang="en-US" sz="3000" dirty="0">
+                <a:latin typeface="News Gothic MT"/>
+                <a:cs typeface="News Gothic MT"/>
+              </a:rPr>
+              <a:t> </a:t>
+            </a:r>
+            <a:r>
+              <a:rPr lang="en-US" sz="3000" dirty="0" smtClean="0">
+                <a:latin typeface="News Gothic MT"/>
+                <a:cs typeface="News Gothic MT"/>
+              </a:rPr>
+              <a:t>with via a </a:t>
+            </a:r>
+            <a:r>
+              <a:rPr lang="en-US" sz="2800" dirty="0">
+                <a:latin typeface="Monaco"/>
+                <a:cs typeface="Monaco"/>
+              </a:rPr>
+              <a:t>Function</a:t>
+            </a:r>
+          </a:p>
+        </p:txBody>
+      </p:sp>
+    </p:spTree>
+    <p:extLst>
+      <p:ext uri="{BB962C8B-B14F-4D97-AF65-F5344CB8AC3E}">
+        <p14:creationId xmlns:p14="http://schemas.microsoft.com/office/powerpoint/2010/main" val="1088367038"/>
+      </p:ext>
+    </p:extLst>
+  </p:cSld>
+  <p:clrMapOvr>
+    <a:masterClrMapping/>
+  </p:clrMapOvr>
+  <p:timing>
+    <p:tnLst>
+      <p:par>
+        <p:cTn xmlns:p14="http://schemas.microsoft.com/office/powerpoint/2010/main" id="1" dur="indefinite" restart="never" nodeType="tmRoot"/>
+      </p:par>
+    </p:tnLst>
+  </p:timing>
+</p:sld>
+</file>
+
+<file path=ppt/slides/slide53.xml><?xml version="1.0" encoding="utf-8"?>
+<p:sld xmlns:a="http://schemas.openxmlformats.org/drawingml/2006/main" xmlns:r="http://schemas.openxmlformats.org/officeDocument/2006/relationships" xmlns:p="http://schemas.openxmlformats.org/presentationml/2006/main">
+  <p:cSld>
+    <p:spTree>
+      <p:nvGrpSpPr>
+        <p:cNvPr id="1" name=""/>
+        <p:cNvGrpSpPr/>
+        <p:nvPr/>
+      </p:nvGrpSpPr>
+      <p:grpSpPr>
+        <a:xfrm>
+          <a:off x="0" y="0"/>
+          <a:ext cx="0" cy="0"/>
+          <a:chOff x="0" y="0"/>
+          <a:chExt cx="0" cy="0"/>
+        </a:xfrm>
+      </p:grpSpPr>
+      <p:sp>
+        <p:nvSpPr>
+          <p:cNvPr id="2" name="Title 1"/>
+          <p:cNvSpPr>
+            <a:spLocks noGrp="1"/>
+          </p:cNvSpPr>
+          <p:nvPr>
+            <p:ph type="title"/>
+          </p:nvPr>
+        </p:nvSpPr>
+        <p:spPr>
+          <a:xfrm>
+            <a:off x="549275" y="1885576"/>
+            <a:ext cx="8042276" cy="1336956"/>
+          </a:xfrm>
+        </p:spPr>
+        <p:txBody>
+          <a:bodyPr/>
+          <a:lstStyle/>
+          <a:p>
+            <a:r>
+              <a:rPr lang="en-US" sz="4400" dirty="0" smtClean="0"/>
+              <a:t/>
+            </a:r>
+            <a:br>
+              <a:rPr lang="en-US" sz="4400" dirty="0" smtClean="0"/>
+            </a:br>
+            <a:r>
+              <a:rPr lang="en-US" sz="4400" dirty="0"/>
+              <a:t/>
+            </a:r>
+            <a:br>
+              <a:rPr lang="en-US" sz="4400" dirty="0"/>
+            </a:br>
+            <a:r>
+              <a:rPr lang="en-US" sz="4400" dirty="0" smtClean="0"/>
+              <a:t/>
+            </a:r>
+            <a:br>
+              <a:rPr lang="en-US" sz="4400" dirty="0" smtClean="0"/>
+            </a:br>
+            <a:r>
+              <a:rPr lang="en-US" sz="4400"/>
+              <a:t/>
+            </a:r>
+            <a:br>
+              <a:rPr lang="en-US" sz="4400"/>
+            </a:br>
+            <a:r>
+              <a:rPr lang="en-US" sz="4400" smtClean="0"/>
+              <a:t>Guava collections </a:t>
+            </a:r>
+            <a:br>
+              <a:rPr lang="en-US" sz="4400" smtClean="0"/>
+            </a:br>
+            <a:r>
+              <a:rPr lang="en-US" sz="4400" smtClean="0"/>
+              <a:t>code </a:t>
+            </a:r>
+            <a:r>
+              <a:rPr lang="en-US" sz="4400" dirty="0" smtClean="0"/>
+              <a:t>example</a:t>
+            </a:r>
+            <a:endParaRPr lang="en-US" sz="4400" dirty="0"/>
+          </a:p>
+        </p:txBody>
+      </p:sp>
+    </p:spTree>
+    <p:extLst>
+      <p:ext uri="{BB962C8B-B14F-4D97-AF65-F5344CB8AC3E}">
+        <p14:creationId xmlns:p14="http://schemas.microsoft.com/office/powerpoint/2010/main" val="477487784"/>
+      </p:ext>
+    </p:extLst>
+  </p:cSld>
+  <p:clrMapOvr>
+    <a:masterClrMapping/>
+  </p:clrMapOvr>
+  <p:timing>
+    <p:tnLst>
+      <p:par>
+        <p:cTn xmlns:p14="http://schemas.microsoft.com/office/powerpoint/2010/main" id="1" dur="indefinite" restart="never" nodeType="tmRoot"/>
+      </p:par>
+    </p:tnLst>
+  </p:timing>
+</p:sld>
+</file>
+
+<file path=ppt/slides/slide54.xml><?xml version="1.0" encoding="utf-8"?>
+<p:sld xmlns:a="http://schemas.openxmlformats.org/drawingml/2006/main" xmlns:r="http://schemas.openxmlformats.org/officeDocument/2006/relationships" xmlns:p="http://schemas.openxmlformats.org/presentationml/2006/main">
+  <p:cSld>
+    <p:spTree>
+      <p:nvGrpSpPr>
+        <p:cNvPr id="1" name=""/>
+        <p:cNvGrpSpPr/>
+        <p:nvPr/>
+      </p:nvGrpSpPr>
+      <p:grpSpPr>
+        <a:xfrm>
+          <a:off x="0" y="0"/>
+          <a:ext cx="0" cy="0"/>
+          <a:chOff x="0" y="0"/>
+          <a:chExt cx="0" cy="0"/>
+        </a:xfrm>
+      </p:grpSpPr>
+      <p:sp>
+        <p:nvSpPr>
+          <p:cNvPr id="2" name="Title 1"/>
+          <p:cNvSpPr>
+            <a:spLocks noGrp="1"/>
+          </p:cNvSpPr>
+          <p:nvPr>
+            <p:ph type="title"/>
+          </p:nvPr>
+        </p:nvSpPr>
+        <p:spPr>
+          <a:xfrm>
+            <a:off x="549275" y="107576"/>
+            <a:ext cx="8042276" cy="1052357"/>
+          </a:xfrm>
+        </p:spPr>
+        <p:txBody>
+          <a:bodyPr/>
+          <a:lstStyle/>
+          <a:p>
+            <a:r>
+              <a:rPr lang="en-US" sz="4400" dirty="0" smtClean="0"/>
+              <a:t>Resources</a:t>
+            </a:r>
+            <a:endParaRPr lang="en-US" sz="4400" dirty="0"/>
+          </a:p>
+        </p:txBody>
+      </p:sp>
+      <p:sp>
+        <p:nvSpPr>
+          <p:cNvPr id="3" name="Content Placeholder 2"/>
+          <p:cNvSpPr>
+            <a:spLocks noGrp="1"/>
+          </p:cNvSpPr>
+          <p:nvPr>
+            <p:ph idx="1"/>
+          </p:nvPr>
+        </p:nvSpPr>
+        <p:spPr>
+          <a:xfrm>
+            <a:off x="549275" y="1350433"/>
+            <a:ext cx="8042276" cy="4965700"/>
+          </a:xfrm>
+        </p:spPr>
+        <p:txBody>
+          <a:bodyPr numCol="1">
+            <a:normAutofit/>
+          </a:bodyPr>
+          <a:lstStyle/>
+          <a:p>
+            <a:r>
+              <a:rPr lang="en-US" sz="3000" dirty="0">
+                <a:cs typeface="News Gothic MT"/>
+              </a:rPr>
+              <a:t>Guava web site: </a:t>
+            </a:r>
+          </a:p>
+          <a:p>
+            <a:pPr lvl="1"/>
+            <a:r>
+              <a:rPr lang="en-US" sz="2400" dirty="0">
+                <a:cs typeface="News Gothic MT"/>
+                <a:hlinkClick r:id="rId2"/>
+              </a:rPr>
+              <a:t>http://code.google.com/p/guava-</a:t>
+            </a:r>
+            <a:r>
+              <a:rPr lang="en-US" sz="2400" dirty="0" smtClean="0">
+                <a:cs typeface="News Gothic MT"/>
+                <a:hlinkClick r:id="rId2"/>
+              </a:rPr>
+              <a:t>libraries</a:t>
+            </a:r>
+            <a:endParaRPr lang="en-US" sz="2400" dirty="0" smtClean="0">
+              <a:cs typeface="News Gothic MT"/>
+            </a:endParaRPr>
+          </a:p>
+          <a:p>
+            <a:r>
+              <a:rPr lang="en-US" sz="3000" dirty="0" smtClean="0">
+                <a:cs typeface="News Gothic MT"/>
+              </a:rPr>
+              <a:t>Slides/code</a:t>
+            </a:r>
+            <a:endParaRPr lang="en-US" sz="3000" dirty="0">
+              <a:cs typeface="News Gothic MT"/>
+            </a:endParaRPr>
+          </a:p>
+          <a:p>
+            <a:pPr lvl="1"/>
+            <a:r>
+              <a:rPr lang="en-US" sz="2400" dirty="0">
+                <a:cs typeface="News Gothic MT"/>
+              </a:rPr>
+              <a:t>https://</a:t>
+            </a:r>
+            <a:r>
+              <a:rPr lang="en-US" sz="2400" dirty="0" err="1">
+                <a:cs typeface="News Gothic MT"/>
+              </a:rPr>
+              <a:t>github.com</a:t>
+            </a:r>
+            <a:r>
+              <a:rPr lang="en-US" sz="2400" dirty="0">
+                <a:cs typeface="News Gothic MT"/>
+              </a:rPr>
+              <a:t>/</a:t>
+            </a:r>
+            <a:r>
+              <a:rPr lang="en-US" sz="2400" dirty="0" err="1">
+                <a:cs typeface="News Gothic MT"/>
+              </a:rPr>
+              <a:t>twoqubed</a:t>
+            </a:r>
+            <a:r>
+              <a:rPr lang="en-US" sz="2400" dirty="0">
+                <a:cs typeface="News Gothic MT"/>
+              </a:rPr>
+              <a:t>/</a:t>
+            </a:r>
+            <a:r>
+              <a:rPr lang="en-US" sz="2400" dirty="0" err="1">
+                <a:cs typeface="News Gothic MT"/>
+              </a:rPr>
+              <a:t>JavaMUG</a:t>
+            </a:r>
+            <a:r>
+              <a:rPr lang="en-US" sz="2400" dirty="0">
+                <a:cs typeface="News Gothic MT"/>
+              </a:rPr>
+              <a:t>-Guava</a:t>
+            </a:r>
+          </a:p>
+        </p:txBody>
+      </p:sp>
+    </p:spTree>
+    <p:extLst>
+      <p:ext uri="{BB962C8B-B14F-4D97-AF65-F5344CB8AC3E}">
+        <p14:creationId xmlns:p14="http://schemas.microsoft.com/office/powerpoint/2010/main" val="3512990949"/>
       </p:ext>
     </p:extLst>
   </p:cSld>

</xml_diff>